<commit_message>
Updated Developer Guide for v1.2
</commit_message>
<xml_diff>
--- a/docs/diagrams/ModelComponentClassDiagram.pptx
+++ b/docs/diagrams/ModelComponentClassDiagram.pptx
@@ -208,7 +208,7 @@
           <a:p>
             <a:fld id="{F5CC4B3F-88C1-4FFA-B1B6-F41C21DC6924}" type="datetimeFigureOut">
               <a:rPr lang="en-US" smtClean="0"/>
-              <a:t>6/27/2018</a:t>
+              <a:t>10/15/2018</a:t>
             </a:fld>
             <a:endParaRPr lang="en-US"/>
           </a:p>
@@ -475,6 +475,90 @@
 </p:notesMaster>
 </file>
 
+<file path=ppt/notesSlides/notesSlide1.xml><?xml version="1.0" encoding="utf-8"?>
+<p:notes xmlns:a="http://schemas.openxmlformats.org/drawingml/2006/main" xmlns:r="http://schemas.openxmlformats.org/officeDocument/2006/relationships" xmlns:p="http://schemas.openxmlformats.org/presentationml/2006/main">
+  <p:cSld>
+    <p:spTree>
+      <p:nvGrpSpPr>
+        <p:cNvPr id="1" name=""/>
+        <p:cNvGrpSpPr/>
+        <p:nvPr/>
+      </p:nvGrpSpPr>
+      <p:grpSpPr>
+        <a:xfrm>
+          <a:off x="0" y="0"/>
+          <a:ext cx="0" cy="0"/>
+          <a:chOff x="0" y="0"/>
+          <a:chExt cx="0" cy="0"/>
+        </a:xfrm>
+      </p:grpSpPr>
+      <p:sp>
+        <p:nvSpPr>
+          <p:cNvPr id="2" name="Slide Image Placeholder 1"/>
+          <p:cNvSpPr>
+            <a:spLocks noGrp="1" noRot="1" noChangeAspect="1"/>
+          </p:cNvSpPr>
+          <p:nvPr>
+            <p:ph type="sldImg"/>
+          </p:nvPr>
+        </p:nvSpPr>
+        <p:spPr/>
+      </p:sp>
+      <p:sp>
+        <p:nvSpPr>
+          <p:cNvPr id="3" name="Notes Placeholder 2"/>
+          <p:cNvSpPr>
+            <a:spLocks noGrp="1"/>
+          </p:cNvSpPr>
+          <p:nvPr>
+            <p:ph type="body" idx="1"/>
+          </p:nvPr>
+        </p:nvSpPr>
+        <p:spPr/>
+        <p:txBody>
+          <a:bodyPr/>
+          <a:lstStyle/>
+          <a:p>
+            <a:endParaRPr lang="en-SG" dirty="0"/>
+          </a:p>
+        </p:txBody>
+      </p:sp>
+      <p:sp>
+        <p:nvSpPr>
+          <p:cNvPr id="4" name="Slide Number Placeholder 3"/>
+          <p:cNvSpPr>
+            <a:spLocks noGrp="1"/>
+          </p:cNvSpPr>
+          <p:nvPr>
+            <p:ph type="sldNum" sz="quarter" idx="10"/>
+          </p:nvPr>
+        </p:nvSpPr>
+        <p:spPr/>
+        <p:txBody>
+          <a:bodyPr/>
+          <a:lstStyle/>
+          <a:p>
+            <a:fld id="{5A7AB025-77E3-4BD1-A2FD-B3183DBA47A3}" type="slidenum">
+              <a:rPr lang="en-US" smtClean="0"/>
+              <a:t>1</a:t>
+            </a:fld>
+            <a:endParaRPr lang="en-US"/>
+          </a:p>
+        </p:txBody>
+      </p:sp>
+    </p:spTree>
+    <p:extLst>
+      <p:ext uri="{BB962C8B-B14F-4D97-AF65-F5344CB8AC3E}">
+        <p14:creationId xmlns:p14="http://schemas.microsoft.com/office/powerpoint/2010/main" val="3914966017"/>
+      </p:ext>
+    </p:extLst>
+  </p:cSld>
+  <p:clrMapOvr>
+    <a:masterClrMapping/>
+  </p:clrMapOvr>
+</p:notes>
+</file>
+
 <file path=ppt/slideLayouts/slideLayout1.xml><?xml version="1.0" encoding="utf-8"?>
 <p:sldLayout xmlns:a="http://schemas.openxmlformats.org/drawingml/2006/main" xmlns:r="http://schemas.openxmlformats.org/officeDocument/2006/relationships" xmlns:p="http://schemas.openxmlformats.org/presentationml/2006/main" type="title" preserve="1">
   <p:cSld name="Title Slide">
@@ -654,7 +738,7 @@
           <a:p>
             <a:fld id="{78C97017-6FC3-485B-9764-EAC9E56C1D49}" type="datetimeFigureOut">
               <a:rPr lang="en-US" smtClean="0"/>
-              <a:t>6/27/2018</a:t>
+              <a:t>10/15/2018</a:t>
             </a:fld>
             <a:endParaRPr lang="en-US"/>
           </a:p>
@@ -822,7 +906,7 @@
           <a:p>
             <a:fld id="{78C97017-6FC3-485B-9764-EAC9E56C1D49}" type="datetimeFigureOut">
               <a:rPr lang="en-US" smtClean="0"/>
-              <a:t>6/27/2018</a:t>
+              <a:t>10/15/2018</a:t>
             </a:fld>
             <a:endParaRPr lang="en-US"/>
           </a:p>
@@ -1000,7 +1084,7 @@
           <a:p>
             <a:fld id="{78C97017-6FC3-485B-9764-EAC9E56C1D49}" type="datetimeFigureOut">
               <a:rPr lang="en-US" smtClean="0"/>
-              <a:t>6/27/2018</a:t>
+              <a:t>10/15/2018</a:t>
             </a:fld>
             <a:endParaRPr lang="en-US"/>
           </a:p>
@@ -1168,7 +1252,7 @@
           <a:p>
             <a:fld id="{78C97017-6FC3-485B-9764-EAC9E56C1D49}" type="datetimeFigureOut">
               <a:rPr lang="en-US" smtClean="0"/>
-              <a:t>6/27/2018</a:t>
+              <a:t>10/15/2018</a:t>
             </a:fld>
             <a:endParaRPr lang="en-US"/>
           </a:p>
@@ -1413,7 +1497,7 @@
           <a:p>
             <a:fld id="{78C97017-6FC3-485B-9764-EAC9E56C1D49}" type="datetimeFigureOut">
               <a:rPr lang="en-US" smtClean="0"/>
-              <a:t>6/27/2018</a:t>
+              <a:t>10/15/2018</a:t>
             </a:fld>
             <a:endParaRPr lang="en-US"/>
           </a:p>
@@ -1698,7 +1782,7 @@
           <a:p>
             <a:fld id="{78C97017-6FC3-485B-9764-EAC9E56C1D49}" type="datetimeFigureOut">
               <a:rPr lang="en-US" smtClean="0"/>
-              <a:t>6/27/2018</a:t>
+              <a:t>10/15/2018</a:t>
             </a:fld>
             <a:endParaRPr lang="en-US"/>
           </a:p>
@@ -2117,7 +2201,7 @@
           <a:p>
             <a:fld id="{78C97017-6FC3-485B-9764-EAC9E56C1D49}" type="datetimeFigureOut">
               <a:rPr lang="en-US" smtClean="0"/>
-              <a:t>6/27/2018</a:t>
+              <a:t>10/15/2018</a:t>
             </a:fld>
             <a:endParaRPr lang="en-US"/>
           </a:p>
@@ -2234,7 +2318,7 @@
           <a:p>
             <a:fld id="{78C97017-6FC3-485B-9764-EAC9E56C1D49}" type="datetimeFigureOut">
               <a:rPr lang="en-US" smtClean="0"/>
-              <a:t>6/27/2018</a:t>
+              <a:t>10/15/2018</a:t>
             </a:fld>
             <a:endParaRPr lang="en-US"/>
           </a:p>
@@ -2329,7 +2413,7 @@
           <a:p>
             <a:fld id="{78C97017-6FC3-485B-9764-EAC9E56C1D49}" type="datetimeFigureOut">
               <a:rPr lang="en-US" smtClean="0"/>
-              <a:t>6/27/2018</a:t>
+              <a:t>10/15/2018</a:t>
             </a:fld>
             <a:endParaRPr lang="en-US"/>
           </a:p>
@@ -2604,7 +2688,7 @@
           <a:p>
             <a:fld id="{78C97017-6FC3-485B-9764-EAC9E56C1D49}" type="datetimeFigureOut">
               <a:rPr lang="en-US" smtClean="0"/>
-              <a:t>6/27/2018</a:t>
+              <a:t>10/15/2018</a:t>
             </a:fld>
             <a:endParaRPr lang="en-US"/>
           </a:p>
@@ -2856,7 +2940,7 @@
           <a:p>
             <a:fld id="{78C97017-6FC3-485B-9764-EAC9E56C1D49}" type="datetimeFigureOut">
               <a:rPr lang="en-US" smtClean="0"/>
-              <a:t>6/27/2018</a:t>
+              <a:t>10/15/2018</a:t>
             </a:fld>
             <a:endParaRPr lang="en-US"/>
           </a:p>
@@ -3067,7 +3151,7 @@
           <a:p>
             <a:fld id="{78C97017-6FC3-485B-9764-EAC9E56C1D49}" type="datetimeFigureOut">
               <a:rPr lang="en-US" smtClean="0"/>
-              <a:t>6/27/2018</a:t>
+              <a:t>10/15/2018</a:t>
             </a:fld>
             <a:endParaRPr lang="en-US"/>
           </a:p>
@@ -3450,8 +3534,8 @@
         </p:nvSpPr>
         <p:spPr>
           <a:xfrm>
-            <a:off x="1119865" y="1600200"/>
-            <a:ext cx="7490735" cy="3124200"/>
+            <a:off x="977321" y="1381021"/>
+            <a:ext cx="7590319" cy="3720776"/>
           </a:xfrm>
           <a:prstGeom prst="roundRect">
             <a:avLst>
@@ -3511,8 +3595,8 @@
         </p:nvSpPr>
         <p:spPr>
           <a:xfrm>
-            <a:off x="2877180" y="3463240"/>
-            <a:ext cx="1093635" cy="346760"/>
+            <a:off x="2973982" y="3075216"/>
+            <a:ext cx="1058332" cy="346760"/>
           </a:xfrm>
           <a:prstGeom prst="rect">
             <a:avLst/>
@@ -3626,19 +3710,19 @@
           <p:cNvPr id="107" name="Elbow Connector 106"/>
           <p:cNvCxnSpPr>
             <a:cxnSpLocks/>
-            <a:stCxn id="9" idx="1"/>
-            <a:endCxn id="62" idx="2"/>
+            <a:stCxn id="9" idx="3"/>
+            <a:endCxn id="62" idx="0"/>
           </p:cNvCxnSpPr>
           <p:nvPr/>
         </p:nvCxnSpPr>
         <p:spPr>
           <a:xfrm rot="5400000" flipH="1" flipV="1">
-            <a:off x="4131507" y="1281685"/>
-            <a:ext cx="613122" cy="4459404"/>
+            <a:off x="4275393" y="610786"/>
+            <a:ext cx="46500" cy="4180554"/>
           </a:xfrm>
           <a:prstGeom prst="bentConnector3">
             <a:avLst>
-              <a:gd name="adj1" fmla="val -26668"/>
+              <a:gd name="adj1" fmla="val 2066452"/>
             </a:avLst>
           </a:prstGeom>
           <a:ln w="19050">
@@ -3674,7 +3758,7 @@
         </p:nvSpPr>
         <p:spPr>
           <a:xfrm rot="16200000">
-            <a:off x="956202" y="2861202"/>
+            <a:off x="725682" y="3089540"/>
             <a:ext cx="1093635" cy="346760"/>
           </a:xfrm>
           <a:prstGeom prst="rect">
@@ -3744,7 +3828,7 @@
         </p:nvSpPr>
         <p:spPr>
           <a:xfrm rot="16200000">
-            <a:off x="1626910" y="2952291"/>
+            <a:off x="1407802" y="3174095"/>
             <a:ext cx="270504" cy="175523"/>
           </a:xfrm>
           <a:prstGeom prst="triangle">
@@ -3787,6 +3871,7 @@
         <p:nvCxnSpPr>
           <p:cNvPr id="58" name="Straight Arrow Connector 57"/>
           <p:cNvCxnSpPr>
+            <a:cxnSpLocks/>
             <a:stCxn id="42" idx="3"/>
             <a:endCxn id="2" idx="1"/>
           </p:cNvCxnSpPr>
@@ -3794,8 +3879,8 @@
         </p:nvCxnSpPr>
         <p:spPr>
           <a:xfrm>
-            <a:off x="2609828" y="3636620"/>
-            <a:ext cx="267352" cy="0"/>
+            <a:off x="2607934" y="3248427"/>
+            <a:ext cx="366048" cy="169"/>
           </a:xfrm>
           <a:prstGeom prst="straightConnector1">
             <a:avLst/>
@@ -3827,13 +3912,15 @@
       <p:cxnSp>
         <p:nvCxnSpPr>
           <p:cNvPr id="75" name="Elbow Connector 122"/>
-          <p:cNvCxnSpPr/>
+          <p:cNvCxnSpPr>
+            <a:cxnSpLocks/>
+          </p:cNvCxnSpPr>
           <p:nvPr/>
         </p:nvCxnSpPr>
         <p:spPr>
-          <a:xfrm>
-            <a:off x="910091" y="3040053"/>
-            <a:ext cx="419548" cy="2860"/>
+          <a:xfrm flipV="1">
+            <a:off x="762000" y="3261857"/>
+            <a:ext cx="343469" cy="2043"/>
           </a:xfrm>
           <a:prstGeom prst="bentConnector3">
             <a:avLst>
@@ -3871,14 +3958,15 @@
         <p:nvCxnSpPr>
           <p:cNvPr id="21" name="Straight Connector 20"/>
           <p:cNvCxnSpPr>
+            <a:cxnSpLocks/>
             <a:stCxn id="120" idx="3"/>
           </p:cNvCxnSpPr>
           <p:nvPr/>
         </p:nvCxnSpPr>
         <p:spPr>
-          <a:xfrm flipV="1">
-            <a:off x="1849924" y="3040052"/>
-            <a:ext cx="216105" cy="1"/>
+          <a:xfrm>
+            <a:off x="1630816" y="3261857"/>
+            <a:ext cx="405153" cy="2837"/>
           </a:xfrm>
           <a:prstGeom prst="line">
             <a:avLst/>
@@ -3916,7 +4004,7 @@
         </p:nvSpPr>
         <p:spPr>
           <a:xfrm>
-            <a:off x="2373780" y="3549930"/>
+            <a:off x="2371886" y="3161737"/>
             <a:ext cx="236048" cy="173380"/>
           </a:xfrm>
           <a:prstGeom prst="flowChartDecision">
@@ -3953,16 +4041,103 @@
           </a:p>
         </p:txBody>
       </p:sp>
-      <p:sp>
-        <p:nvSpPr>
-          <p:cNvPr id="46" name="Rectangle 8"/>
+      <p:cxnSp>
+        <p:nvCxnSpPr>
+          <p:cNvPr id="47" name="Straight Arrow Connector 46"/>
+          <p:cNvCxnSpPr>
+            <a:cxnSpLocks/>
+            <a:stCxn id="48" idx="3"/>
+            <a:endCxn id="55" idx="1"/>
+          </p:cNvCxnSpPr>
+          <p:nvPr/>
+        </p:nvCxnSpPr>
+        <p:spPr>
+          <a:xfrm flipV="1">
+            <a:off x="2625603" y="2848107"/>
+            <a:ext cx="347957" cy="3466"/>
+          </a:xfrm>
+          <a:prstGeom prst="straightConnector1">
+            <a:avLst/>
+          </a:prstGeom>
+          <a:ln w="19050">
+            <a:solidFill>
+              <a:srgbClr val="7030A0"/>
+            </a:solidFill>
+            <a:headEnd type="none" w="med" len="med"/>
+            <a:tailEnd type="arrow" w="med" len="med"/>
+          </a:ln>
+          <a:effectLst/>
+        </p:spPr>
+        <p:style>
+          <a:lnRef idx="1">
+            <a:schemeClr val="accent2"/>
+          </a:lnRef>
+          <a:fillRef idx="2">
+            <a:schemeClr val="accent2"/>
+          </a:fillRef>
+          <a:effectRef idx="1">
+            <a:schemeClr val="accent2"/>
+          </a:effectRef>
+          <a:fontRef idx="minor">
+            <a:schemeClr val="dk1"/>
+          </a:fontRef>
+        </p:style>
+      </p:cxnSp>
+      <p:sp>
+        <p:nvSpPr>
+          <p:cNvPr id="48" name="Flowchart: Decision 96"/>
           <p:cNvSpPr/>
           <p:nvPr/>
         </p:nvSpPr>
         <p:spPr>
           <a:xfrm>
-            <a:off x="2825280" y="2846162"/>
-            <a:ext cx="1490560" cy="334856"/>
+            <a:off x="2389555" y="2764883"/>
+            <a:ext cx="236048" cy="173380"/>
+          </a:xfrm>
+          <a:prstGeom prst="flowChartDecision">
+            <a:avLst/>
+          </a:prstGeom>
+          <a:noFill/>
+          <a:ln w="19050">
+            <a:solidFill>
+              <a:srgbClr val="7030A0"/>
+            </a:solidFill>
+          </a:ln>
+          <a:effectLst/>
+        </p:spPr>
+        <p:style>
+          <a:lnRef idx="1">
+            <a:schemeClr val="accent6"/>
+          </a:lnRef>
+          <a:fillRef idx="2">
+            <a:schemeClr val="accent6"/>
+          </a:fillRef>
+          <a:effectRef idx="1">
+            <a:schemeClr val="accent6"/>
+          </a:effectRef>
+          <a:fontRef idx="minor">
+            <a:schemeClr val="dk1"/>
+          </a:fontRef>
+        </p:style>
+        <p:txBody>
+          <a:bodyPr rtlCol="0" anchor="ctr"/>
+          <a:lstStyle/>
+          <a:p>
+            <a:pPr algn="ctr"/>
+            <a:endParaRPr lang="en-US" sz="1050"/>
+          </a:p>
+        </p:txBody>
+      </p:sp>
+      <p:sp>
+        <p:nvSpPr>
+          <p:cNvPr id="49" name="Rectangle 8"/>
+          <p:cNvSpPr/>
+          <p:nvPr/>
+        </p:nvSpPr>
+        <p:spPr>
+          <a:xfrm>
+            <a:off x="4457844" y="2665909"/>
+            <a:ext cx="1156969" cy="346760"/>
           </a:xfrm>
           <a:prstGeom prst="rect">
             <a:avLst/>
@@ -3994,12 +4169,12 @@
           <a:p>
             <a:pPr algn="ctr"/>
             <a:r>
-              <a:rPr lang="en-US" sz="1050" dirty="0" err="1" smtClean="0">
+              <a:rPr lang="en-US" sz="1050" dirty="0" err="1">
                 <a:solidFill>
                   <a:srgbClr val="7030A0"/>
                 </a:solidFill>
               </a:rPr>
-              <a:t>VersionedAddressBook</a:t>
+              <a:t>UniquePersonList</a:t>
             </a:r>
             <a:endParaRPr lang="en-SG" sz="1050" dirty="0">
               <a:solidFill>
@@ -4009,62 +4184,23 @@
           </a:p>
         </p:txBody>
       </p:sp>
-      <p:cxnSp>
-        <p:nvCxnSpPr>
-          <p:cNvPr id="47" name="Straight Arrow Connector 46"/>
-          <p:cNvCxnSpPr>
-            <a:stCxn id="48" idx="3"/>
-            <a:endCxn id="46" idx="1"/>
-          </p:cNvCxnSpPr>
-          <p:nvPr/>
-        </p:nvCxnSpPr>
-        <p:spPr>
-          <a:xfrm>
-            <a:off x="2624360" y="3003033"/>
-            <a:ext cx="200920" cy="10557"/>
-          </a:xfrm>
-          <a:prstGeom prst="straightConnector1">
-            <a:avLst/>
-          </a:prstGeom>
-          <a:ln w="19050">
-            <a:solidFill>
-              <a:srgbClr val="7030A0"/>
-            </a:solidFill>
-            <a:headEnd type="none" w="med" len="med"/>
-            <a:tailEnd type="arrow" w="med" len="med"/>
-          </a:ln>
-          <a:effectLst/>
-        </p:spPr>
-        <p:style>
-          <a:lnRef idx="1">
-            <a:schemeClr val="accent2"/>
-          </a:lnRef>
-          <a:fillRef idx="2">
-            <a:schemeClr val="accent2"/>
-          </a:fillRef>
-          <a:effectRef idx="1">
-            <a:schemeClr val="accent2"/>
-          </a:effectRef>
-          <a:fontRef idx="minor">
-            <a:schemeClr val="dk1"/>
-          </a:fontRef>
-        </p:style>
-      </p:cxnSp>
-      <p:sp>
-        <p:nvSpPr>
-          <p:cNvPr id="48" name="Flowchart: Decision 96"/>
+      <p:sp>
+        <p:nvSpPr>
+          <p:cNvPr id="51" name="Flowchart: Decision 96"/>
           <p:cNvSpPr/>
           <p:nvPr/>
         </p:nvSpPr>
         <p:spPr>
           <a:xfrm>
-            <a:off x="2388312" y="2916343"/>
+            <a:off x="4046122" y="2740279"/>
             <a:ext cx="236048" cy="173380"/>
           </a:xfrm>
           <a:prstGeom prst="flowChartDecision">
             <a:avLst/>
           </a:prstGeom>
-          <a:noFill/>
+          <a:solidFill>
+            <a:srgbClr val="7030A0"/>
+          </a:solidFill>
           <a:ln w="19050">
             <a:solidFill>
               <a:srgbClr val="7030A0"/>
@@ -4097,14 +4233,14 @@
       </p:sp>
       <p:sp>
         <p:nvSpPr>
-          <p:cNvPr id="49" name="Rectangle 8"/>
+          <p:cNvPr id="62" name="Rectangle 8"/>
           <p:cNvSpPr/>
           <p:nvPr/>
         </p:nvSpPr>
         <p:spPr>
           <a:xfrm>
-            <a:off x="4692650" y="2846162"/>
-            <a:ext cx="1156969" cy="346760"/>
+            <a:off x="6034827" y="2677813"/>
+            <a:ext cx="708186" cy="346760"/>
           </a:xfrm>
           <a:prstGeom prst="rect">
             <a:avLst/>
@@ -4136,12 +4272,12 @@
           <a:p>
             <a:pPr algn="ctr"/>
             <a:r>
-              <a:rPr lang="en-US" sz="1050" dirty="0" err="1">
+              <a:rPr lang="en-US" sz="1050" dirty="0">
                 <a:solidFill>
                   <a:srgbClr val="7030A0"/>
                 </a:solidFill>
               </a:rPr>
-              <a:t>UniquePersonList</a:t>
+              <a:t>Person</a:t>
             </a:r>
             <a:endParaRPr lang="en-SG" sz="1050" dirty="0">
               <a:solidFill>
@@ -4153,21 +4289,19 @@
       </p:sp>
       <p:sp>
         <p:nvSpPr>
-          <p:cNvPr id="51" name="Flowchart: Decision 96"/>
+          <p:cNvPr id="63" name="Flowchart: Decision 96"/>
           <p:cNvSpPr/>
           <p:nvPr/>
         </p:nvSpPr>
         <p:spPr>
           <a:xfrm>
-            <a:off x="4324972" y="2920532"/>
+            <a:off x="5623793" y="2763798"/>
             <a:ext cx="236048" cy="173380"/>
           </a:xfrm>
           <a:prstGeom prst="flowChartDecision">
             <a:avLst/>
           </a:prstGeom>
-          <a:solidFill>
-            <a:srgbClr val="7030A0"/>
-          </a:solidFill>
+          <a:noFill/>
           <a:ln w="19050">
             <a:solidFill>
               <a:srgbClr val="7030A0"/>
@@ -4198,16 +4332,59 @@
           </a:p>
         </p:txBody>
       </p:sp>
-      <p:sp>
-        <p:nvSpPr>
-          <p:cNvPr id="62" name="Rectangle 8"/>
+      <p:cxnSp>
+        <p:nvCxnSpPr>
+          <p:cNvPr id="64" name="Elbow Connector 63"/>
+          <p:cNvCxnSpPr>
+            <a:stCxn id="63" idx="3"/>
+            <a:endCxn id="62" idx="1"/>
+          </p:cNvCxnSpPr>
+          <p:nvPr/>
+        </p:nvCxnSpPr>
+        <p:spPr>
+          <a:xfrm>
+            <a:off x="5859841" y="2850488"/>
+            <a:ext cx="174986" cy="705"/>
+          </a:xfrm>
+          <a:prstGeom prst="bentConnector3">
+            <a:avLst>
+              <a:gd name="adj1" fmla="val 85382"/>
+            </a:avLst>
+          </a:prstGeom>
+          <a:ln w="19050">
+            <a:solidFill>
+              <a:srgbClr val="7030A0"/>
+            </a:solidFill>
+            <a:headEnd type="none" w="med" len="med"/>
+            <a:tailEnd type="arrow" w="med" len="med"/>
+          </a:ln>
+          <a:effectLst/>
+        </p:spPr>
+        <p:style>
+          <a:lnRef idx="1">
+            <a:schemeClr val="accent2"/>
+          </a:lnRef>
+          <a:fillRef idx="2">
+            <a:schemeClr val="accent2"/>
+          </a:fillRef>
+          <a:effectRef idx="1">
+            <a:schemeClr val="accent2"/>
+          </a:effectRef>
+          <a:fontRef idx="minor">
+            <a:schemeClr val="dk1"/>
+          </a:fontRef>
+        </p:style>
+      </p:cxnSp>
+      <p:sp>
+        <p:nvSpPr>
+          <p:cNvPr id="76" name="Rectangle 8"/>
           <p:cNvSpPr/>
           <p:nvPr/>
         </p:nvSpPr>
         <p:spPr>
           <a:xfrm>
-            <a:off x="6313677" y="2858066"/>
-            <a:ext cx="708186" cy="346760"/>
+            <a:off x="7436329" y="2063772"/>
+            <a:ext cx="708186" cy="222366"/>
           </a:xfrm>
           <a:prstGeom prst="rect">
             <a:avLst/>
@@ -4244,7 +4421,7 @@
                   <a:srgbClr val="7030A0"/>
                 </a:solidFill>
               </a:rPr>
-              <a:t>Person</a:t>
+              <a:t>Name</a:t>
             </a:r>
             <a:endParaRPr lang="en-SG" sz="1050" dirty="0">
               <a:solidFill>
@@ -4256,19 +4433,21 @@
       </p:sp>
       <p:sp>
         <p:nvSpPr>
-          <p:cNvPr id="63" name="Flowchart: Decision 96"/>
+          <p:cNvPr id="78" name="Flowchart: Decision 96"/>
           <p:cNvSpPr/>
           <p:nvPr/>
         </p:nvSpPr>
         <p:spPr>
           <a:xfrm>
-            <a:off x="5858751" y="2941676"/>
+            <a:off x="6763097" y="2767948"/>
             <a:ext cx="236048" cy="173380"/>
           </a:xfrm>
           <a:prstGeom prst="flowChartDecision">
             <a:avLst/>
           </a:prstGeom>
-          <a:noFill/>
+          <a:solidFill>
+            <a:srgbClr val="7030A0"/>
+          </a:solidFill>
           <a:ln w="19050">
             <a:solidFill>
               <a:srgbClr val="7030A0"/>
@@ -4301,19 +4480,19 @@
       </p:sp>
       <p:cxnSp>
         <p:nvCxnSpPr>
-          <p:cNvPr id="64" name="Elbow Connector 63"/>
+          <p:cNvPr id="79" name="Elbow Connector 78"/>
           <p:cNvCxnSpPr>
-            <a:stCxn id="63" idx="3"/>
-            <a:endCxn id="62" idx="1"/>
+            <a:cxnSpLocks/>
+            <a:endCxn id="76" idx="1"/>
           </p:cNvCxnSpPr>
           <p:nvPr/>
         </p:nvCxnSpPr>
         <p:spPr>
-          <a:xfrm>
-            <a:off x="6094799" y="3028366"/>
-            <a:ext cx="218878" cy="3080"/>
-          </a:xfrm>
-          <a:prstGeom prst="bentConnector3">
+          <a:xfrm rot="5400000" flipH="1" flipV="1">
+            <a:off x="7010681" y="2369941"/>
+            <a:ext cx="620633" cy="230663"/>
+          </a:xfrm>
+          <a:prstGeom prst="bentConnector2">
             <a:avLst/>
           </a:prstGeom>
           <a:ln w="19050">
@@ -4340,16 +4519,148 @@
           </a:fontRef>
         </p:style>
       </p:cxnSp>
-      <p:sp>
-        <p:nvSpPr>
-          <p:cNvPr id="76" name="Rectangle 8"/>
+      <p:cxnSp>
+        <p:nvCxnSpPr>
+          <p:cNvPr id="81" name="Elbow Connector 80"/>
+          <p:cNvCxnSpPr>
+            <a:cxnSpLocks/>
+            <a:stCxn id="78" idx="3"/>
+            <a:endCxn id="147" idx="1"/>
+          </p:cNvCxnSpPr>
+          <p:nvPr/>
+        </p:nvCxnSpPr>
+        <p:spPr>
+          <a:xfrm flipV="1">
+            <a:off x="6999145" y="2464399"/>
+            <a:ext cx="448618" cy="390239"/>
+          </a:xfrm>
+          <a:prstGeom prst="bentConnector3">
+            <a:avLst>
+              <a:gd name="adj1" fmla="val 46284"/>
+            </a:avLst>
+          </a:prstGeom>
+          <a:ln w="19050">
+            <a:solidFill>
+              <a:srgbClr val="7030A0"/>
+            </a:solidFill>
+            <a:headEnd type="none" w="med" len="med"/>
+            <a:tailEnd type="arrow" w="med" len="med"/>
+          </a:ln>
+          <a:effectLst/>
+        </p:spPr>
+        <p:style>
+          <a:lnRef idx="1">
+            <a:schemeClr val="accent2"/>
+          </a:lnRef>
+          <a:fillRef idx="2">
+            <a:schemeClr val="accent2"/>
+          </a:fillRef>
+          <a:effectRef idx="1">
+            <a:schemeClr val="accent2"/>
+          </a:effectRef>
+          <a:fontRef idx="minor">
+            <a:schemeClr val="dk1"/>
+          </a:fontRef>
+        </p:style>
+      </p:cxnSp>
+      <p:cxnSp>
+        <p:nvCxnSpPr>
+          <p:cNvPr id="84" name="Elbow Connector 83"/>
+          <p:cNvCxnSpPr>
+            <a:cxnSpLocks/>
+            <a:stCxn id="78" idx="3"/>
+            <a:endCxn id="148" idx="1"/>
+          </p:cNvCxnSpPr>
+          <p:nvPr/>
+        </p:nvCxnSpPr>
+        <p:spPr>
+          <a:xfrm flipV="1">
+            <a:off x="6999145" y="2755214"/>
+            <a:ext cx="445905" cy="99424"/>
+          </a:xfrm>
+          <a:prstGeom prst="bentConnector3">
+            <a:avLst>
+              <a:gd name="adj1" fmla="val 46262"/>
+            </a:avLst>
+          </a:prstGeom>
+          <a:ln w="19050">
+            <a:solidFill>
+              <a:srgbClr val="7030A0"/>
+            </a:solidFill>
+            <a:headEnd type="none" w="med" len="med"/>
+            <a:tailEnd type="arrow" w="med" len="med"/>
+          </a:ln>
+          <a:effectLst/>
+        </p:spPr>
+        <p:style>
+          <a:lnRef idx="1">
+            <a:schemeClr val="accent2"/>
+          </a:lnRef>
+          <a:fillRef idx="2">
+            <a:schemeClr val="accent2"/>
+          </a:fillRef>
+          <a:effectRef idx="1">
+            <a:schemeClr val="accent2"/>
+          </a:effectRef>
+          <a:fontRef idx="minor">
+            <a:schemeClr val="dk1"/>
+          </a:fontRef>
+        </p:style>
+      </p:cxnSp>
+      <p:cxnSp>
+        <p:nvCxnSpPr>
+          <p:cNvPr id="86" name="Elbow Connector 85"/>
+          <p:cNvCxnSpPr>
+            <a:cxnSpLocks/>
+            <a:stCxn id="78" idx="3"/>
+            <a:endCxn id="149" idx="1"/>
+          </p:cNvCxnSpPr>
+          <p:nvPr/>
+        </p:nvCxnSpPr>
+        <p:spPr>
+          <a:xfrm>
+            <a:off x="6999145" y="2854638"/>
+            <a:ext cx="442940" cy="183589"/>
+          </a:xfrm>
+          <a:prstGeom prst="bentConnector3">
+            <a:avLst>
+              <a:gd name="adj1" fmla="val 46774"/>
+            </a:avLst>
+          </a:prstGeom>
+          <a:ln w="19050">
+            <a:solidFill>
+              <a:srgbClr val="7030A0"/>
+            </a:solidFill>
+            <a:headEnd type="none" w="med" len="med"/>
+            <a:tailEnd type="arrow" w="med" len="med"/>
+          </a:ln>
+          <a:effectLst/>
+        </p:spPr>
+        <p:style>
+          <a:lnRef idx="1">
+            <a:schemeClr val="accent2"/>
+          </a:lnRef>
+          <a:fillRef idx="2">
+            <a:schemeClr val="accent2"/>
+          </a:fillRef>
+          <a:effectRef idx="1">
+            <a:schemeClr val="accent2"/>
+          </a:effectRef>
+          <a:fontRef idx="minor">
+            <a:schemeClr val="dk1"/>
+          </a:fontRef>
+        </p:style>
+      </p:cxnSp>
+      <p:sp>
+        <p:nvSpPr>
+          <p:cNvPr id="100" name="Rectangle 8"/>
           <p:cNvSpPr/>
           <p:nvPr/>
         </p:nvSpPr>
         <p:spPr>
           <a:xfrm>
-            <a:off x="7712397" y="2564238"/>
-            <a:ext cx="708186" cy="285783"/>
+            <a:off x="2780127" y="1916908"/>
+            <a:ext cx="1443661" cy="364396"/>
           </a:xfrm>
           <a:prstGeom prst="rect">
             <a:avLst/>
@@ -4386,7 +4697,22 @@
                   <a:srgbClr val="7030A0"/>
                 </a:solidFill>
               </a:rPr>
-              <a:t>Name</a:t>
+              <a:t>&lt;&lt;interface&gt;&gt;</a:t>
+            </a:r>
+            <a:br>
+              <a:rPr lang="en-US" sz="1050" dirty="0">
+                <a:solidFill>
+                  <a:srgbClr val="7030A0"/>
+                </a:solidFill>
+              </a:rPr>
+            </a:br>
+            <a:r>
+              <a:rPr lang="en-US" sz="1050" dirty="0" err="1">
+                <a:solidFill>
+                  <a:srgbClr val="7030A0"/>
+                </a:solidFill>
+              </a:rPr>
+              <a:t>ReadOnlyAddressBook</a:t>
             </a:r>
             <a:endParaRPr lang="en-SG" sz="1050" dirty="0">
               <a:solidFill>
@@ -4398,101 +4724,53 @@
       </p:sp>
       <p:sp>
         <p:nvSpPr>
-          <p:cNvPr id="78" name="Flowchart: Decision 96"/>
+          <p:cNvPr id="114" name="TextBox 113"/>
+          <p:cNvSpPr txBox="1"/>
+          <p:nvPr/>
+        </p:nvSpPr>
+        <p:spPr>
+          <a:xfrm>
+            <a:off x="5536176" y="4505340"/>
+            <a:ext cx="881018" cy="261610"/>
+          </a:xfrm>
+          <a:prstGeom prst="rect">
+            <a:avLst/>
+          </a:prstGeom>
+          <a:noFill/>
+        </p:spPr>
+        <p:txBody>
+          <a:bodyPr wrap="square" rtlCol="0">
+            <a:spAutoFit/>
+          </a:bodyPr>
+          <a:lstStyle/>
+          <a:p>
+            <a:pPr algn="r"/>
+            <a:r>
+              <a:rPr lang="en-US" sz="1100" dirty="0">
+                <a:solidFill>
+                  <a:srgbClr val="7030A0"/>
+                </a:solidFill>
+              </a:rPr>
+              <a:t>filtered list</a:t>
+            </a:r>
+            <a:endParaRPr lang="en-SG" sz="1100" dirty="0">
+              <a:solidFill>
+                <a:srgbClr val="7030A0"/>
+              </a:solidFill>
+            </a:endParaRPr>
+          </a:p>
+        </p:txBody>
+      </p:sp>
+      <p:sp>
+        <p:nvSpPr>
+          <p:cNvPr id="122" name="Rectangle 8"/>
           <p:cNvSpPr/>
           <p:nvPr/>
         </p:nvSpPr>
         <p:spPr>
-          <a:xfrm>
-            <a:off x="7041947" y="2948201"/>
-            <a:ext cx="236048" cy="173380"/>
-          </a:xfrm>
-          <a:prstGeom prst="flowChartDecision">
-            <a:avLst/>
-          </a:prstGeom>
-          <a:solidFill>
-            <a:srgbClr val="7030A0"/>
-          </a:solidFill>
-          <a:ln w="19050">
-            <a:solidFill>
-              <a:srgbClr val="7030A0"/>
-            </a:solidFill>
-          </a:ln>
-          <a:effectLst/>
-        </p:spPr>
-        <p:style>
-          <a:lnRef idx="1">
-            <a:schemeClr val="accent6"/>
-          </a:lnRef>
-          <a:fillRef idx="2">
-            <a:schemeClr val="accent6"/>
-          </a:fillRef>
-          <a:effectRef idx="1">
-            <a:schemeClr val="accent6"/>
-          </a:effectRef>
-          <a:fontRef idx="minor">
-            <a:schemeClr val="dk1"/>
-          </a:fontRef>
-        </p:style>
-        <p:txBody>
-          <a:bodyPr rtlCol="0" anchor="ctr"/>
-          <a:lstStyle/>
-          <a:p>
-            <a:pPr algn="ctr"/>
-            <a:endParaRPr lang="en-US" sz="1050"/>
-          </a:p>
-        </p:txBody>
-      </p:sp>
-      <p:cxnSp>
-        <p:nvCxnSpPr>
-          <p:cNvPr id="79" name="Elbow Connector 78"/>
-          <p:cNvCxnSpPr>
-            <a:cxnSpLocks/>
-          </p:cNvCxnSpPr>
-          <p:nvPr/>
-        </p:nvCxnSpPr>
-        <p:spPr>
-          <a:xfrm flipV="1">
-            <a:off x="7277995" y="2706821"/>
-            <a:ext cx="434402" cy="327761"/>
-          </a:xfrm>
-          <a:prstGeom prst="bentConnector3">
-            <a:avLst/>
-          </a:prstGeom>
-          <a:ln w="19050">
-            <a:solidFill>
-              <a:srgbClr val="7030A0"/>
-            </a:solidFill>
-            <a:headEnd type="none" w="med" len="med"/>
-            <a:tailEnd type="arrow" w="med" len="med"/>
-          </a:ln>
-          <a:effectLst/>
-        </p:spPr>
-        <p:style>
-          <a:lnRef idx="1">
-            <a:schemeClr val="accent2"/>
-          </a:lnRef>
-          <a:fillRef idx="2">
-            <a:schemeClr val="accent2"/>
-          </a:fillRef>
-          <a:effectRef idx="1">
-            <a:schemeClr val="accent2"/>
-          </a:effectRef>
-          <a:fontRef idx="minor">
-            <a:schemeClr val="dk1"/>
-          </a:fontRef>
-        </p:style>
-      </p:cxnSp>
-      <p:sp>
-        <p:nvSpPr>
-          <p:cNvPr id="80" name="Rectangle 8"/>
-          <p:cNvSpPr/>
-          <p:nvPr/>
-        </p:nvSpPr>
-        <p:spPr>
-          <a:xfrm>
-            <a:off x="7712397" y="2887216"/>
-            <a:ext cx="708186" cy="285783"/>
+          <a:xfrm rot="16200000">
+            <a:off x="1240598" y="4289108"/>
+            <a:ext cx="1066800" cy="346760"/>
           </a:xfrm>
           <a:prstGeom prst="rect">
             <a:avLst/>
@@ -4529,388 +4807,6 @@
                   <a:srgbClr val="7030A0"/>
                 </a:solidFill>
               </a:rPr>
-              <a:t>Phone</a:t>
-            </a:r>
-            <a:endParaRPr lang="en-SG" sz="1050" dirty="0">
-              <a:solidFill>
-                <a:srgbClr val="7030A0"/>
-              </a:solidFill>
-            </a:endParaRPr>
-          </a:p>
-        </p:txBody>
-      </p:sp>
-      <p:cxnSp>
-        <p:nvCxnSpPr>
-          <p:cNvPr id="81" name="Elbow Connector 80"/>
-          <p:cNvCxnSpPr>
-            <a:stCxn id="78" idx="3"/>
-            <a:endCxn id="80" idx="1"/>
-          </p:cNvCxnSpPr>
-          <p:nvPr/>
-        </p:nvCxnSpPr>
-        <p:spPr>
-          <a:xfrm flipV="1">
-            <a:off x="7277995" y="3030108"/>
-            <a:ext cx="434402" cy="4783"/>
-          </a:xfrm>
-          <a:prstGeom prst="bentConnector3">
-            <a:avLst/>
-          </a:prstGeom>
-          <a:ln w="19050">
-            <a:solidFill>
-              <a:srgbClr val="7030A0"/>
-            </a:solidFill>
-            <a:headEnd type="none" w="med" len="med"/>
-            <a:tailEnd type="arrow" w="med" len="med"/>
-          </a:ln>
-          <a:effectLst/>
-        </p:spPr>
-        <p:style>
-          <a:lnRef idx="1">
-            <a:schemeClr val="accent2"/>
-          </a:lnRef>
-          <a:fillRef idx="2">
-            <a:schemeClr val="accent2"/>
-          </a:fillRef>
-          <a:effectRef idx="1">
-            <a:schemeClr val="accent2"/>
-          </a:effectRef>
-          <a:fontRef idx="minor">
-            <a:schemeClr val="dk1"/>
-          </a:fontRef>
-        </p:style>
-      </p:cxnSp>
-      <p:sp>
-        <p:nvSpPr>
-          <p:cNvPr id="83" name="Rectangle 8"/>
-          <p:cNvSpPr/>
-          <p:nvPr/>
-        </p:nvSpPr>
-        <p:spPr>
-          <a:xfrm>
-            <a:off x="7712397" y="3210194"/>
-            <a:ext cx="708186" cy="285783"/>
-          </a:xfrm>
-          <a:prstGeom prst="rect">
-            <a:avLst/>
-          </a:prstGeom>
-          <a:ln w="19050">
-            <a:solidFill>
-              <a:srgbClr val="7030A0"/>
-            </a:solidFill>
-          </a:ln>
-          <a:effectLst/>
-        </p:spPr>
-        <p:style>
-          <a:lnRef idx="1">
-            <a:schemeClr val="accent4"/>
-          </a:lnRef>
-          <a:fillRef idx="2">
-            <a:schemeClr val="accent4"/>
-          </a:fillRef>
-          <a:effectRef idx="1">
-            <a:schemeClr val="accent4"/>
-          </a:effectRef>
-          <a:fontRef idx="minor">
-            <a:schemeClr val="dk1"/>
-          </a:fontRef>
-        </p:style>
-        <p:txBody>
-          <a:bodyPr rtlCol="0" anchor="ctr"/>
-          <a:lstStyle/>
-          <a:p>
-            <a:pPr algn="ctr"/>
-            <a:r>
-              <a:rPr lang="en-US" sz="1050" dirty="0">
-                <a:solidFill>
-                  <a:srgbClr val="7030A0"/>
-                </a:solidFill>
-              </a:rPr>
-              <a:t>Email</a:t>
-            </a:r>
-            <a:endParaRPr lang="en-SG" sz="1050" dirty="0">
-              <a:solidFill>
-                <a:srgbClr val="7030A0"/>
-              </a:solidFill>
-            </a:endParaRPr>
-          </a:p>
-        </p:txBody>
-      </p:sp>
-      <p:cxnSp>
-        <p:nvCxnSpPr>
-          <p:cNvPr id="84" name="Elbow Connector 83"/>
-          <p:cNvCxnSpPr>
-            <a:stCxn id="78" idx="3"/>
-            <a:endCxn id="83" idx="1"/>
-          </p:cNvCxnSpPr>
-          <p:nvPr/>
-        </p:nvCxnSpPr>
-        <p:spPr>
-          <a:xfrm>
-            <a:off x="7277995" y="3034891"/>
-            <a:ext cx="434402" cy="318195"/>
-          </a:xfrm>
-          <a:prstGeom prst="bentConnector3">
-            <a:avLst/>
-          </a:prstGeom>
-          <a:ln w="19050">
-            <a:solidFill>
-              <a:srgbClr val="7030A0"/>
-            </a:solidFill>
-            <a:headEnd type="none" w="med" len="med"/>
-            <a:tailEnd type="arrow" w="med" len="med"/>
-          </a:ln>
-          <a:effectLst/>
-        </p:spPr>
-        <p:style>
-          <a:lnRef idx="1">
-            <a:schemeClr val="accent2"/>
-          </a:lnRef>
-          <a:fillRef idx="2">
-            <a:schemeClr val="accent2"/>
-          </a:fillRef>
-          <a:effectRef idx="1">
-            <a:schemeClr val="accent2"/>
-          </a:effectRef>
-          <a:fontRef idx="minor">
-            <a:schemeClr val="dk1"/>
-          </a:fontRef>
-        </p:style>
-      </p:cxnSp>
-      <p:sp>
-        <p:nvSpPr>
-          <p:cNvPr id="85" name="Rectangle 8"/>
-          <p:cNvSpPr/>
-          <p:nvPr/>
-        </p:nvSpPr>
-        <p:spPr>
-          <a:xfrm>
-            <a:off x="7712397" y="3533171"/>
-            <a:ext cx="708186" cy="285783"/>
-          </a:xfrm>
-          <a:prstGeom prst="rect">
-            <a:avLst/>
-          </a:prstGeom>
-          <a:ln w="19050">
-            <a:solidFill>
-              <a:srgbClr val="7030A0"/>
-            </a:solidFill>
-          </a:ln>
-          <a:effectLst/>
-        </p:spPr>
-        <p:style>
-          <a:lnRef idx="1">
-            <a:schemeClr val="accent4"/>
-          </a:lnRef>
-          <a:fillRef idx="2">
-            <a:schemeClr val="accent4"/>
-          </a:fillRef>
-          <a:effectRef idx="1">
-            <a:schemeClr val="accent4"/>
-          </a:effectRef>
-          <a:fontRef idx="minor">
-            <a:schemeClr val="dk1"/>
-          </a:fontRef>
-        </p:style>
-        <p:txBody>
-          <a:bodyPr rtlCol="0" anchor="ctr"/>
-          <a:lstStyle/>
-          <a:p>
-            <a:pPr algn="ctr"/>
-            <a:r>
-              <a:rPr lang="en-US" sz="1050" dirty="0">
-                <a:solidFill>
-                  <a:srgbClr val="7030A0"/>
-                </a:solidFill>
-              </a:rPr>
-              <a:t>Address</a:t>
-            </a:r>
-            <a:endParaRPr lang="en-SG" sz="1050" dirty="0">
-              <a:solidFill>
-                <a:srgbClr val="7030A0"/>
-              </a:solidFill>
-            </a:endParaRPr>
-          </a:p>
-        </p:txBody>
-      </p:sp>
-      <p:cxnSp>
-        <p:nvCxnSpPr>
-          <p:cNvPr id="86" name="Elbow Connector 85"/>
-          <p:cNvCxnSpPr>
-            <a:stCxn id="78" idx="3"/>
-            <a:endCxn id="85" idx="1"/>
-          </p:cNvCxnSpPr>
-          <p:nvPr/>
-        </p:nvCxnSpPr>
-        <p:spPr>
-          <a:xfrm>
-            <a:off x="7277995" y="3034891"/>
-            <a:ext cx="434402" cy="641172"/>
-          </a:xfrm>
-          <a:prstGeom prst="bentConnector3">
-            <a:avLst/>
-          </a:prstGeom>
-          <a:ln w="19050">
-            <a:solidFill>
-              <a:srgbClr val="7030A0"/>
-            </a:solidFill>
-            <a:headEnd type="none" w="med" len="med"/>
-            <a:tailEnd type="arrow" w="med" len="med"/>
-          </a:ln>
-          <a:effectLst/>
-        </p:spPr>
-        <p:style>
-          <a:lnRef idx="1">
-            <a:schemeClr val="accent2"/>
-          </a:lnRef>
-          <a:fillRef idx="2">
-            <a:schemeClr val="accent2"/>
-          </a:fillRef>
-          <a:effectRef idx="1">
-            <a:schemeClr val="accent2"/>
-          </a:effectRef>
-          <a:fontRef idx="minor">
-            <a:schemeClr val="dk1"/>
-          </a:fontRef>
-        </p:style>
-      </p:cxnSp>
-      <p:cxnSp>
-        <p:nvCxnSpPr>
-          <p:cNvPr id="97" name="Elbow Connector 63"/>
-          <p:cNvCxnSpPr>
-            <a:stCxn id="99" idx="3"/>
-          </p:cNvCxnSpPr>
-          <p:nvPr/>
-        </p:nvCxnSpPr>
-        <p:spPr>
-          <a:xfrm rot="5400000">
-            <a:off x="3553611" y="2687559"/>
-            <a:ext cx="293825" cy="5938"/>
-          </a:xfrm>
-          <a:prstGeom prst="bentConnector3">
-            <a:avLst>
-              <a:gd name="adj1" fmla="val 50000"/>
-            </a:avLst>
-          </a:prstGeom>
-          <a:ln w="19050">
-            <a:solidFill>
-              <a:srgbClr val="7030A0"/>
-            </a:solidFill>
-            <a:prstDash val="sysDot"/>
-            <a:headEnd type="none" w="med" len="med"/>
-            <a:tailEnd type="none" w="med" len="med"/>
-          </a:ln>
-          <a:effectLst/>
-        </p:spPr>
-        <p:style>
-          <a:lnRef idx="1">
-            <a:schemeClr val="accent2"/>
-          </a:lnRef>
-          <a:fillRef idx="2">
-            <a:schemeClr val="accent2"/>
-          </a:fillRef>
-          <a:effectRef idx="1">
-            <a:schemeClr val="accent2"/>
-          </a:effectRef>
-          <a:fontRef idx="minor">
-            <a:schemeClr val="dk1"/>
-          </a:fontRef>
-        </p:style>
-      </p:cxnSp>
-      <p:sp>
-        <p:nvSpPr>
-          <p:cNvPr id="99" name="Isosceles Triangle 102"/>
-          <p:cNvSpPr/>
-          <p:nvPr/>
-        </p:nvSpPr>
-        <p:spPr>
-          <a:xfrm rot="10800000" flipV="1">
-            <a:off x="3562299" y="2386554"/>
-            <a:ext cx="282387" cy="157062"/>
-          </a:xfrm>
-          <a:prstGeom prst="triangle">
-            <a:avLst/>
-          </a:prstGeom>
-          <a:ln w="19050">
-            <a:solidFill>
-              <a:srgbClr val="7030A0"/>
-            </a:solidFill>
-          </a:ln>
-          <a:effectLst/>
-        </p:spPr>
-        <p:style>
-          <a:lnRef idx="1">
-            <a:schemeClr val="accent4"/>
-          </a:lnRef>
-          <a:fillRef idx="2">
-            <a:schemeClr val="accent4"/>
-          </a:fillRef>
-          <a:effectRef idx="1">
-            <a:schemeClr val="accent4"/>
-          </a:effectRef>
-          <a:fontRef idx="minor">
-            <a:schemeClr val="dk1"/>
-          </a:fontRef>
-        </p:style>
-        <p:txBody>
-          <a:bodyPr rtlCol="0" anchor="ctr"/>
-          <a:lstStyle/>
-          <a:p>
-            <a:pPr algn="ctr"/>
-            <a:endParaRPr lang="en-SG" sz="1050" b="1">
-              <a:solidFill>
-                <a:srgbClr val="92D050"/>
-              </a:solidFill>
-            </a:endParaRPr>
-          </a:p>
-        </p:txBody>
-      </p:sp>
-      <p:sp>
-        <p:nvSpPr>
-          <p:cNvPr id="100" name="Rectangle 8"/>
-          <p:cNvSpPr/>
-          <p:nvPr/>
-        </p:nvSpPr>
-        <p:spPr>
-          <a:xfrm>
-            <a:off x="1260922" y="1998350"/>
-            <a:ext cx="1443661" cy="364396"/>
-          </a:xfrm>
-          <a:prstGeom prst="rect">
-            <a:avLst/>
-          </a:prstGeom>
-          <a:ln w="19050">
-            <a:solidFill>
-              <a:srgbClr val="7030A0"/>
-            </a:solidFill>
-          </a:ln>
-          <a:effectLst/>
-        </p:spPr>
-        <p:style>
-          <a:lnRef idx="1">
-            <a:schemeClr val="accent4"/>
-          </a:lnRef>
-          <a:fillRef idx="2">
-            <a:schemeClr val="accent4"/>
-          </a:fillRef>
-          <a:effectRef idx="1">
-            <a:schemeClr val="accent4"/>
-          </a:effectRef>
-          <a:fontRef idx="minor">
-            <a:schemeClr val="dk1"/>
-          </a:fontRef>
-        </p:style>
-        <p:txBody>
-          <a:bodyPr rtlCol="0" anchor="ctr"/>
-          <a:lstStyle/>
-          <a:p>
-            <a:pPr algn="ctr"/>
-            <a:r>
-              <a:rPr lang="en-US" sz="1050" dirty="0">
-                <a:solidFill>
-                  <a:srgbClr val="7030A0"/>
-                </a:solidFill>
-              </a:rPr>
               <a:t>&lt;&lt;interface&gt;&gt;</a:t>
             </a:r>
             <a:br>
@@ -4926,7 +4822,7 @@
                   <a:srgbClr val="7030A0"/>
                 </a:solidFill>
               </a:rPr>
-              <a:t>ReadOnlyAddressBook</a:t>
+              <a:t>ObservableList</a:t>
             </a:r>
             <a:endParaRPr lang="en-SG" sz="1050" dirty="0">
               <a:solidFill>
@@ -4936,140 +4832,26 @@
           </a:p>
         </p:txBody>
       </p:sp>
-      <p:sp>
-        <p:nvSpPr>
-          <p:cNvPr id="114" name="TextBox 113"/>
-          <p:cNvSpPr txBox="1"/>
-          <p:nvPr/>
-        </p:nvSpPr>
-        <p:spPr>
-          <a:xfrm rot="16200000">
-            <a:off x="6362886" y="3586305"/>
-            <a:ext cx="881018" cy="261610"/>
-          </a:xfrm>
-          <a:prstGeom prst="rect">
-            <a:avLst/>
-          </a:prstGeom>
-          <a:noFill/>
-        </p:spPr>
-        <p:txBody>
-          <a:bodyPr wrap="square" rtlCol="0">
-            <a:spAutoFit/>
-          </a:bodyPr>
-          <a:lstStyle/>
-          <a:p>
-            <a:pPr algn="r"/>
-            <a:r>
-              <a:rPr lang="en-US" sz="1100" dirty="0">
-                <a:solidFill>
-                  <a:srgbClr val="7030A0"/>
-                </a:solidFill>
-              </a:rPr>
-              <a:t>filtered list</a:t>
-            </a:r>
-            <a:endParaRPr lang="en-SG" sz="1100" dirty="0">
-              <a:solidFill>
-                <a:srgbClr val="7030A0"/>
-              </a:solidFill>
-            </a:endParaRPr>
-          </a:p>
-        </p:txBody>
-      </p:sp>
-      <p:sp>
-        <p:nvSpPr>
-          <p:cNvPr id="122" name="Rectangle 8"/>
-          <p:cNvSpPr/>
-          <p:nvPr/>
-        </p:nvSpPr>
-        <p:spPr>
-          <a:xfrm>
-            <a:off x="2057401" y="4239491"/>
-            <a:ext cx="1066800" cy="346760"/>
-          </a:xfrm>
-          <a:prstGeom prst="rect">
-            <a:avLst/>
-          </a:prstGeom>
-          <a:ln w="19050">
-            <a:solidFill>
-              <a:srgbClr val="7030A0"/>
-            </a:solidFill>
-          </a:ln>
-          <a:effectLst/>
-        </p:spPr>
-        <p:style>
-          <a:lnRef idx="1">
-            <a:schemeClr val="accent4"/>
-          </a:lnRef>
-          <a:fillRef idx="2">
-            <a:schemeClr val="accent4"/>
-          </a:fillRef>
-          <a:effectRef idx="1">
-            <a:schemeClr val="accent4"/>
-          </a:effectRef>
-          <a:fontRef idx="minor">
-            <a:schemeClr val="dk1"/>
-          </a:fontRef>
-        </p:style>
-        <p:txBody>
-          <a:bodyPr rtlCol="0" anchor="ctr"/>
-          <a:lstStyle/>
-          <a:p>
-            <a:pPr algn="ctr"/>
-            <a:r>
-              <a:rPr lang="en-US" sz="1050" dirty="0">
-                <a:solidFill>
-                  <a:srgbClr val="7030A0"/>
-                </a:solidFill>
-              </a:rPr>
-              <a:t>&lt;&lt;interface&gt;&gt;</a:t>
-            </a:r>
-            <a:r>
-              <a:rPr lang="en-US" sz="1050">
-                <a:solidFill>
-                  <a:srgbClr val="7030A0"/>
-                </a:solidFill>
-              </a:rPr>
-              <a:t/>
-            </a:r>
-            <a:br>
-              <a:rPr lang="en-US" sz="1050">
-                <a:solidFill>
-                  <a:srgbClr val="7030A0"/>
-                </a:solidFill>
-              </a:rPr>
-            </a:br>
-            <a:r>
-              <a:rPr lang="en-US" sz="1050" dirty="0" err="1">
-                <a:solidFill>
-                  <a:srgbClr val="7030A0"/>
-                </a:solidFill>
-              </a:rPr>
-              <a:t>ObservableList</a:t>
-            </a:r>
-            <a:endParaRPr lang="en-SG" sz="1050" dirty="0">
-              <a:solidFill>
-                <a:srgbClr val="7030A0"/>
-              </a:solidFill>
-            </a:endParaRPr>
-          </a:p>
-        </p:txBody>
-      </p:sp>
       <p:cxnSp>
         <p:nvCxnSpPr>
           <p:cNvPr id="124" name="Elbow Connector 122"/>
           <p:cNvCxnSpPr>
+            <a:cxnSpLocks/>
             <a:stCxn id="119" idx="1"/>
-            <a:endCxn id="122" idx="1"/>
+            <a:endCxn id="122" idx="0"/>
           </p:cNvCxnSpPr>
           <p:nvPr/>
         </p:nvCxnSpPr>
         <p:spPr>
           <a:xfrm rot="16200000" flipH="1">
-            <a:off x="1364475" y="3719944"/>
-            <a:ext cx="831471" cy="554381"/>
-          </a:xfrm>
-          <a:prstGeom prst="bentConnector2">
-            <a:avLst/>
+            <a:off x="1110184" y="3972054"/>
+            <a:ext cx="652750" cy="328118"/>
+          </a:xfrm>
+          <a:prstGeom prst="bentConnector4">
+            <a:avLst>
+              <a:gd name="adj1" fmla="val 65324"/>
+              <a:gd name="adj2" fmla="val -635"/>
+            </a:avLst>
           </a:prstGeom>
           <a:ln w="19050">
             <a:solidFill>
@@ -5104,7 +4886,7 @@
         </p:nvSpPr>
         <p:spPr>
           <a:xfrm>
-            <a:off x="4429979" y="3111479"/>
+            <a:off x="4310113" y="2628038"/>
             <a:ext cx="189257" cy="178683"/>
           </a:xfrm>
           <a:prstGeom prst="rect">
@@ -5143,7 +4925,7 @@
         </p:nvSpPr>
         <p:spPr>
           <a:xfrm>
-            <a:off x="6135256" y="3097917"/>
+            <a:off x="5862740" y="2665909"/>
             <a:ext cx="189257" cy="178683"/>
           </a:xfrm>
           <a:prstGeom prst="rect">
@@ -5182,7 +4964,7 @@
         </p:nvSpPr>
         <p:spPr>
           <a:xfrm>
-            <a:off x="2573394" y="2756715"/>
+            <a:off x="2625603" y="2640593"/>
             <a:ext cx="170110" cy="137542"/>
           </a:xfrm>
           <a:prstGeom prst="rect">
@@ -5221,7 +5003,7 @@
         </p:nvSpPr>
         <p:spPr>
           <a:xfrm>
-            <a:off x="2707070" y="3667737"/>
+            <a:off x="2716625" y="3072395"/>
             <a:ext cx="189257" cy="178683"/>
           </a:xfrm>
           <a:prstGeom prst="rect">
@@ -5260,7 +5042,7 @@
         </p:nvSpPr>
         <p:spPr>
           <a:xfrm>
-            <a:off x="6449896" y="3204826"/>
+            <a:off x="6142533" y="2478882"/>
             <a:ext cx="189257" cy="178683"/>
           </a:xfrm>
           <a:prstGeom prst="rect">
@@ -5305,8 +5087,8 @@
         </p:nvSpPr>
         <p:spPr>
           <a:xfrm>
-            <a:off x="7712397" y="2228817"/>
-            <a:ext cx="708186" cy="285783"/>
+            <a:off x="7442085" y="1452941"/>
+            <a:ext cx="697283" cy="241689"/>
           </a:xfrm>
           <a:prstGeom prst="rect">
             <a:avLst/>
@@ -5371,12 +5153,12 @@
         </p:nvCxnSpPr>
         <p:spPr>
           <a:xfrm flipV="1">
-            <a:off x="7277995" y="2371709"/>
-            <a:ext cx="434402" cy="663182"/>
+            <a:off x="6999145" y="1573786"/>
+            <a:ext cx="442940" cy="1280852"/>
           </a:xfrm>
           <a:prstGeom prst="bentConnector3">
             <a:avLst>
-              <a:gd name="adj1" fmla="val 50000"/>
+              <a:gd name="adj1" fmla="val 46774"/>
             </a:avLst>
           </a:prstGeom>
           <a:ln w="19050">
@@ -5417,7 +5199,7 @@
         </p:nvSpPr>
         <p:spPr>
           <a:xfrm>
-            <a:off x="7466243" y="2255711"/>
+            <a:off x="7235421" y="1407034"/>
             <a:ext cx="189257" cy="178683"/>
           </a:xfrm>
           <a:prstGeom prst="rect">
@@ -5456,7 +5238,7 @@
         </p:nvSpPr>
         <p:spPr>
           <a:xfrm>
-            <a:off x="3170181" y="1998350"/>
+            <a:off x="2973560" y="2665909"/>
             <a:ext cx="1060683" cy="364396"/>
           </a:xfrm>
           <a:prstGeom prst="rect">
@@ -5508,6 +5290,7 @@
         <p:nvCxnSpPr>
           <p:cNvPr id="60" name="Straight Arrow Connector 59"/>
           <p:cNvCxnSpPr>
+            <a:cxnSpLocks/>
             <a:stCxn id="51" idx="1"/>
             <a:endCxn id="49" idx="1"/>
           </p:cNvCxnSpPr>
@@ -5515,8 +5298,8 @@
         </p:nvCxnSpPr>
         <p:spPr>
           <a:xfrm>
-            <a:off x="4324972" y="3007222"/>
-            <a:ext cx="367678" cy="12320"/>
+            <a:off x="4046122" y="2826969"/>
+            <a:ext cx="411722" cy="12320"/>
           </a:xfrm>
           <a:prstGeom prst="straightConnector1">
             <a:avLst/>
@@ -5552,8 +5335,8 @@
           <p:nvPr/>
         </p:nvSpPr>
         <p:spPr>
-          <a:xfrm rot="16200000">
-            <a:off x="2669073" y="2069158"/>
+          <a:xfrm>
+            <a:off x="3381311" y="2282038"/>
             <a:ext cx="271014" cy="187417"/>
           </a:xfrm>
           <a:prstGeom prst="triangle">
@@ -5601,15 +5384,16 @@
         <p:nvCxnSpPr>
           <p:cNvPr id="69" name="Elbow Connector 63"/>
           <p:cNvCxnSpPr>
+            <a:cxnSpLocks/>
             <a:stCxn id="68" idx="3"/>
-            <a:endCxn id="55" idx="1"/>
+            <a:endCxn id="55" idx="0"/>
           </p:cNvCxnSpPr>
           <p:nvPr/>
         </p:nvCxnSpPr>
         <p:spPr>
-          <a:xfrm>
-            <a:off x="2898289" y="2177727"/>
-            <a:ext cx="271892" cy="2821"/>
+          <a:xfrm rot="16200000" flipH="1">
+            <a:off x="3404703" y="2566710"/>
+            <a:ext cx="196454" cy="1944"/>
           </a:xfrm>
           <a:prstGeom prst="bentConnector3">
             <a:avLst>
@@ -5641,6 +5425,1623 @@
           </a:fontRef>
         </p:style>
       </p:cxnSp>
+      <p:cxnSp>
+        <p:nvCxnSpPr>
+          <p:cNvPr id="67" name="Straight Arrow Connector 66">
+            <a:extLst>
+              <a:ext uri="{FF2B5EF4-FFF2-40B4-BE49-F238E27FC236}">
+                <a16:creationId xmlns:a16="http://schemas.microsoft.com/office/drawing/2014/main" id="{46C88A94-971B-4CD0-ADCE-C9F65AC7CB54}"/>
+              </a:ext>
+            </a:extLst>
+          </p:cNvPr>
+          <p:cNvCxnSpPr>
+            <a:cxnSpLocks/>
+            <a:stCxn id="71" idx="3"/>
+            <a:endCxn id="73" idx="1"/>
+          </p:cNvCxnSpPr>
+          <p:nvPr/>
+        </p:nvCxnSpPr>
+        <p:spPr>
+          <a:xfrm flipV="1">
+            <a:off x="2625603" y="3656750"/>
+            <a:ext cx="347957" cy="3466"/>
+          </a:xfrm>
+          <a:prstGeom prst="straightConnector1">
+            <a:avLst/>
+          </a:prstGeom>
+          <a:ln w="19050">
+            <a:solidFill>
+              <a:srgbClr val="7030A0"/>
+            </a:solidFill>
+            <a:headEnd type="none" w="med" len="med"/>
+            <a:tailEnd type="arrow" w="med" len="med"/>
+          </a:ln>
+          <a:effectLst/>
+        </p:spPr>
+        <p:style>
+          <a:lnRef idx="1">
+            <a:schemeClr val="accent2"/>
+          </a:lnRef>
+          <a:fillRef idx="2">
+            <a:schemeClr val="accent2"/>
+          </a:fillRef>
+          <a:effectRef idx="1">
+            <a:schemeClr val="accent2"/>
+          </a:effectRef>
+          <a:fontRef idx="minor">
+            <a:schemeClr val="dk1"/>
+          </a:fontRef>
+        </p:style>
+      </p:cxnSp>
+      <p:sp>
+        <p:nvSpPr>
+          <p:cNvPr id="71" name="Flowchart: Decision 96">
+            <a:extLst>
+              <a:ext uri="{FF2B5EF4-FFF2-40B4-BE49-F238E27FC236}">
+                <a16:creationId xmlns:a16="http://schemas.microsoft.com/office/drawing/2014/main" id="{247E8F5B-562F-48F2-A14E-FE45390836ED}"/>
+              </a:ext>
+            </a:extLst>
+          </p:cNvPr>
+          <p:cNvSpPr/>
+          <p:nvPr/>
+        </p:nvSpPr>
+        <p:spPr>
+          <a:xfrm>
+            <a:off x="2389555" y="3573526"/>
+            <a:ext cx="236048" cy="173380"/>
+          </a:xfrm>
+          <a:prstGeom prst="flowChartDecision">
+            <a:avLst/>
+          </a:prstGeom>
+          <a:noFill/>
+          <a:ln w="19050">
+            <a:solidFill>
+              <a:srgbClr val="7030A0"/>
+            </a:solidFill>
+          </a:ln>
+          <a:effectLst/>
+        </p:spPr>
+        <p:style>
+          <a:lnRef idx="1">
+            <a:schemeClr val="accent6"/>
+          </a:lnRef>
+          <a:fillRef idx="2">
+            <a:schemeClr val="accent6"/>
+          </a:fillRef>
+          <a:effectRef idx="1">
+            <a:schemeClr val="accent6"/>
+          </a:effectRef>
+          <a:fontRef idx="minor">
+            <a:schemeClr val="dk1"/>
+          </a:fontRef>
+        </p:style>
+        <p:txBody>
+          <a:bodyPr rtlCol="0" anchor="ctr"/>
+          <a:lstStyle/>
+          <a:p>
+            <a:pPr algn="ctr"/>
+            <a:endParaRPr lang="en-US" sz="1050"/>
+          </a:p>
+        </p:txBody>
+      </p:sp>
+      <p:sp>
+        <p:nvSpPr>
+          <p:cNvPr id="72" name="TextBox 71">
+            <a:extLst>
+              <a:ext uri="{FF2B5EF4-FFF2-40B4-BE49-F238E27FC236}">
+                <a16:creationId xmlns:a16="http://schemas.microsoft.com/office/drawing/2014/main" id="{2EA762D4-6339-4C23-B96F-6B0696DBE029}"/>
+              </a:ext>
+            </a:extLst>
+          </p:cNvPr>
+          <p:cNvSpPr txBox="1"/>
+          <p:nvPr/>
+        </p:nvSpPr>
+        <p:spPr>
+          <a:xfrm>
+            <a:off x="2625603" y="3449236"/>
+            <a:ext cx="170110" cy="137542"/>
+          </a:xfrm>
+          <a:prstGeom prst="rect">
+            <a:avLst/>
+          </a:prstGeom>
+          <a:noFill/>
+        </p:spPr>
+        <p:txBody>
+          <a:bodyPr wrap="square" lIns="0" tIns="0" rIns="0" bIns="0" rtlCol="0">
+            <a:noAutofit/>
+          </a:bodyPr>
+          <a:lstStyle/>
+          <a:p>
+            <a:pPr algn="ctr"/>
+            <a:r>
+              <a:rPr lang="en-US" sz="1100" dirty="0">
+                <a:solidFill>
+                  <a:srgbClr val="7030A0"/>
+                </a:solidFill>
+              </a:rPr>
+              <a:t>1</a:t>
+            </a:r>
+            <a:endParaRPr lang="en-SG" sz="1100" dirty="0">
+              <a:solidFill>
+                <a:srgbClr val="7030A0"/>
+              </a:solidFill>
+            </a:endParaRPr>
+          </a:p>
+        </p:txBody>
+      </p:sp>
+      <p:sp>
+        <p:nvSpPr>
+          <p:cNvPr id="73" name="Rectangle 8">
+            <a:extLst>
+              <a:ext uri="{FF2B5EF4-FFF2-40B4-BE49-F238E27FC236}">
+                <a16:creationId xmlns:a16="http://schemas.microsoft.com/office/drawing/2014/main" id="{FFDEF901-0CFE-4F1F-B10F-5074533D5FC8}"/>
+              </a:ext>
+            </a:extLst>
+          </p:cNvPr>
+          <p:cNvSpPr/>
+          <p:nvPr/>
+        </p:nvSpPr>
+        <p:spPr>
+          <a:xfrm>
+            <a:off x="2973560" y="3474552"/>
+            <a:ext cx="1060683" cy="364396"/>
+          </a:xfrm>
+          <a:prstGeom prst="rect">
+            <a:avLst/>
+          </a:prstGeom>
+          <a:ln w="19050">
+            <a:solidFill>
+              <a:srgbClr val="7030A0"/>
+            </a:solidFill>
+          </a:ln>
+          <a:effectLst/>
+        </p:spPr>
+        <p:style>
+          <a:lnRef idx="1">
+            <a:schemeClr val="accent4"/>
+          </a:lnRef>
+          <a:fillRef idx="2">
+            <a:schemeClr val="accent4"/>
+          </a:fillRef>
+          <a:effectRef idx="1">
+            <a:schemeClr val="accent4"/>
+          </a:effectRef>
+          <a:fontRef idx="minor">
+            <a:schemeClr val="dk1"/>
+          </a:fontRef>
+        </p:style>
+        <p:txBody>
+          <a:bodyPr rtlCol="0" anchor="ctr"/>
+          <a:lstStyle/>
+          <a:p>
+            <a:pPr algn="ctr"/>
+            <a:r>
+              <a:rPr lang="en-US" sz="1050" dirty="0">
+                <a:solidFill>
+                  <a:srgbClr val="7030A0"/>
+                </a:solidFill>
+              </a:rPr>
+              <a:t>Schedule</a:t>
+            </a:r>
+          </a:p>
+        </p:txBody>
+      </p:sp>
+      <p:sp>
+        <p:nvSpPr>
+          <p:cNvPr id="116" name="Rectangle 8">
+            <a:extLst>
+              <a:ext uri="{FF2B5EF4-FFF2-40B4-BE49-F238E27FC236}">
+                <a16:creationId xmlns:a16="http://schemas.microsoft.com/office/drawing/2014/main" id="{EA4BD03A-3A63-422D-9D4A-DCD62DA7A73B}"/>
+              </a:ext>
+            </a:extLst>
+          </p:cNvPr>
+          <p:cNvSpPr/>
+          <p:nvPr/>
+        </p:nvSpPr>
+        <p:spPr>
+          <a:xfrm>
+            <a:off x="4454458" y="3486836"/>
+            <a:ext cx="1156969" cy="346760"/>
+          </a:xfrm>
+          <a:prstGeom prst="rect">
+            <a:avLst/>
+          </a:prstGeom>
+          <a:ln w="19050">
+            <a:solidFill>
+              <a:srgbClr val="7030A0"/>
+            </a:solidFill>
+          </a:ln>
+          <a:effectLst/>
+        </p:spPr>
+        <p:style>
+          <a:lnRef idx="1">
+            <a:schemeClr val="accent4"/>
+          </a:lnRef>
+          <a:fillRef idx="2">
+            <a:schemeClr val="accent4"/>
+          </a:fillRef>
+          <a:effectRef idx="1">
+            <a:schemeClr val="accent4"/>
+          </a:effectRef>
+          <a:fontRef idx="minor">
+            <a:schemeClr val="dk1"/>
+          </a:fontRef>
+        </p:style>
+        <p:txBody>
+          <a:bodyPr rtlCol="0" anchor="ctr"/>
+          <a:lstStyle/>
+          <a:p>
+            <a:pPr algn="ctr"/>
+            <a:r>
+              <a:rPr lang="en-US" sz="1050" dirty="0" err="1">
+                <a:solidFill>
+                  <a:srgbClr val="7030A0"/>
+                </a:solidFill>
+              </a:rPr>
+              <a:t>UniqueSchedule</a:t>
+            </a:r>
+            <a:endParaRPr lang="en-US" sz="1050" dirty="0">
+              <a:solidFill>
+                <a:srgbClr val="7030A0"/>
+              </a:solidFill>
+            </a:endParaRPr>
+          </a:p>
+          <a:p>
+            <a:pPr algn="ctr"/>
+            <a:r>
+              <a:rPr lang="en-US" sz="1050" dirty="0" err="1">
+                <a:solidFill>
+                  <a:srgbClr val="7030A0"/>
+                </a:solidFill>
+              </a:rPr>
+              <a:t>EventList</a:t>
+            </a:r>
+            <a:endParaRPr lang="en-SG" sz="1050" dirty="0">
+              <a:solidFill>
+                <a:srgbClr val="7030A0"/>
+              </a:solidFill>
+            </a:endParaRPr>
+          </a:p>
+        </p:txBody>
+      </p:sp>
+      <p:sp>
+        <p:nvSpPr>
+          <p:cNvPr id="117" name="Flowchart: Decision 96">
+            <a:extLst>
+              <a:ext uri="{FF2B5EF4-FFF2-40B4-BE49-F238E27FC236}">
+                <a16:creationId xmlns:a16="http://schemas.microsoft.com/office/drawing/2014/main" id="{B8053C0A-AD34-4685-832A-270C18C714E6}"/>
+              </a:ext>
+            </a:extLst>
+          </p:cNvPr>
+          <p:cNvSpPr/>
+          <p:nvPr/>
+        </p:nvSpPr>
+        <p:spPr>
+          <a:xfrm>
+            <a:off x="4042736" y="3561206"/>
+            <a:ext cx="236048" cy="173380"/>
+          </a:xfrm>
+          <a:prstGeom prst="flowChartDecision">
+            <a:avLst/>
+          </a:prstGeom>
+          <a:solidFill>
+            <a:srgbClr val="7030A0"/>
+          </a:solidFill>
+          <a:ln w="19050">
+            <a:solidFill>
+              <a:srgbClr val="7030A0"/>
+            </a:solidFill>
+          </a:ln>
+          <a:effectLst/>
+        </p:spPr>
+        <p:style>
+          <a:lnRef idx="1">
+            <a:schemeClr val="accent6"/>
+          </a:lnRef>
+          <a:fillRef idx="2">
+            <a:schemeClr val="accent6"/>
+          </a:fillRef>
+          <a:effectRef idx="1">
+            <a:schemeClr val="accent6"/>
+          </a:effectRef>
+          <a:fontRef idx="minor">
+            <a:schemeClr val="dk1"/>
+          </a:fontRef>
+        </p:style>
+        <p:txBody>
+          <a:bodyPr rtlCol="0" anchor="ctr"/>
+          <a:lstStyle/>
+          <a:p>
+            <a:pPr algn="ctr"/>
+            <a:endParaRPr lang="en-US" sz="1050"/>
+          </a:p>
+        </p:txBody>
+      </p:sp>
+      <p:sp>
+        <p:nvSpPr>
+          <p:cNvPr id="121" name="Rectangle 8">
+            <a:extLst>
+              <a:ext uri="{FF2B5EF4-FFF2-40B4-BE49-F238E27FC236}">
+                <a16:creationId xmlns:a16="http://schemas.microsoft.com/office/drawing/2014/main" id="{9D29A43A-1DD3-44AD-A01D-5A4A0BC418A6}"/>
+              </a:ext>
+            </a:extLst>
+          </p:cNvPr>
+          <p:cNvSpPr/>
+          <p:nvPr/>
+        </p:nvSpPr>
+        <p:spPr>
+          <a:xfrm>
+            <a:off x="6031441" y="3498740"/>
+            <a:ext cx="708186" cy="346760"/>
+          </a:xfrm>
+          <a:prstGeom prst="rect">
+            <a:avLst/>
+          </a:prstGeom>
+          <a:ln w="19050">
+            <a:solidFill>
+              <a:srgbClr val="7030A0"/>
+            </a:solidFill>
+          </a:ln>
+          <a:effectLst/>
+        </p:spPr>
+        <p:style>
+          <a:lnRef idx="1">
+            <a:schemeClr val="accent4"/>
+          </a:lnRef>
+          <a:fillRef idx="2">
+            <a:schemeClr val="accent4"/>
+          </a:fillRef>
+          <a:effectRef idx="1">
+            <a:schemeClr val="accent4"/>
+          </a:effectRef>
+          <a:fontRef idx="minor">
+            <a:schemeClr val="dk1"/>
+          </a:fontRef>
+        </p:style>
+        <p:txBody>
+          <a:bodyPr rtlCol="0" anchor="ctr"/>
+          <a:lstStyle/>
+          <a:p>
+            <a:pPr algn="ctr"/>
+            <a:r>
+              <a:rPr lang="en-US" sz="1050" dirty="0" err="1">
+                <a:solidFill>
+                  <a:srgbClr val="7030A0"/>
+                </a:solidFill>
+              </a:rPr>
+              <a:t>ScheduleEvent</a:t>
+            </a:r>
+            <a:endParaRPr lang="en-SG" sz="1050" dirty="0">
+              <a:solidFill>
+                <a:srgbClr val="7030A0"/>
+              </a:solidFill>
+            </a:endParaRPr>
+          </a:p>
+        </p:txBody>
+      </p:sp>
+      <p:sp>
+        <p:nvSpPr>
+          <p:cNvPr id="123" name="Flowchart: Decision 96">
+            <a:extLst>
+              <a:ext uri="{FF2B5EF4-FFF2-40B4-BE49-F238E27FC236}">
+                <a16:creationId xmlns:a16="http://schemas.microsoft.com/office/drawing/2014/main" id="{E2911C00-9A3E-4716-A2EF-2B4B9C8FE476}"/>
+              </a:ext>
+            </a:extLst>
+          </p:cNvPr>
+          <p:cNvSpPr/>
+          <p:nvPr/>
+        </p:nvSpPr>
+        <p:spPr>
+          <a:xfrm>
+            <a:off x="5620407" y="3584725"/>
+            <a:ext cx="236048" cy="173380"/>
+          </a:xfrm>
+          <a:prstGeom prst="flowChartDecision">
+            <a:avLst/>
+          </a:prstGeom>
+          <a:noFill/>
+          <a:ln w="19050">
+            <a:solidFill>
+              <a:srgbClr val="7030A0"/>
+            </a:solidFill>
+          </a:ln>
+          <a:effectLst/>
+        </p:spPr>
+        <p:style>
+          <a:lnRef idx="1">
+            <a:schemeClr val="accent6"/>
+          </a:lnRef>
+          <a:fillRef idx="2">
+            <a:schemeClr val="accent6"/>
+          </a:fillRef>
+          <a:effectRef idx="1">
+            <a:schemeClr val="accent6"/>
+          </a:effectRef>
+          <a:fontRef idx="minor">
+            <a:schemeClr val="dk1"/>
+          </a:fontRef>
+        </p:style>
+        <p:txBody>
+          <a:bodyPr rtlCol="0" anchor="ctr"/>
+          <a:lstStyle/>
+          <a:p>
+            <a:pPr algn="ctr"/>
+            <a:endParaRPr lang="en-US" sz="1050"/>
+          </a:p>
+        </p:txBody>
+      </p:sp>
+      <p:sp>
+        <p:nvSpPr>
+          <p:cNvPr id="125" name="TextBox 124">
+            <a:extLst>
+              <a:ext uri="{FF2B5EF4-FFF2-40B4-BE49-F238E27FC236}">
+                <a16:creationId xmlns:a16="http://schemas.microsoft.com/office/drawing/2014/main" id="{C6C14086-1640-470D-A62B-AD25D9FDD180}"/>
+              </a:ext>
+            </a:extLst>
+          </p:cNvPr>
+          <p:cNvSpPr txBox="1"/>
+          <p:nvPr/>
+        </p:nvSpPr>
+        <p:spPr>
+          <a:xfrm>
+            <a:off x="4306727" y="3448965"/>
+            <a:ext cx="189257" cy="178683"/>
+          </a:xfrm>
+          <a:prstGeom prst="rect">
+            <a:avLst/>
+          </a:prstGeom>
+          <a:noFill/>
+        </p:spPr>
+        <p:txBody>
+          <a:bodyPr wrap="square" lIns="0" tIns="0" rIns="0" bIns="0" rtlCol="0">
+            <a:noAutofit/>
+          </a:bodyPr>
+          <a:lstStyle/>
+          <a:p>
+            <a:pPr algn="ctr"/>
+            <a:r>
+              <a:rPr lang="en-US" sz="1100" dirty="0">
+                <a:solidFill>
+                  <a:srgbClr val="7030A0"/>
+                </a:solidFill>
+              </a:rPr>
+              <a:t>1</a:t>
+            </a:r>
+            <a:endParaRPr lang="en-SG" sz="1100" dirty="0">
+              <a:solidFill>
+                <a:srgbClr val="7030A0"/>
+              </a:solidFill>
+            </a:endParaRPr>
+          </a:p>
+        </p:txBody>
+      </p:sp>
+      <p:sp>
+        <p:nvSpPr>
+          <p:cNvPr id="126" name="TextBox 125">
+            <a:extLst>
+              <a:ext uri="{FF2B5EF4-FFF2-40B4-BE49-F238E27FC236}">
+                <a16:creationId xmlns:a16="http://schemas.microsoft.com/office/drawing/2014/main" id="{EDF5EA29-7365-4DDB-9715-F2A7494ABF4D}"/>
+              </a:ext>
+            </a:extLst>
+          </p:cNvPr>
+          <p:cNvSpPr txBox="1"/>
+          <p:nvPr/>
+        </p:nvSpPr>
+        <p:spPr>
+          <a:xfrm>
+            <a:off x="5859354" y="3486836"/>
+            <a:ext cx="189257" cy="178683"/>
+          </a:xfrm>
+          <a:prstGeom prst="rect">
+            <a:avLst/>
+          </a:prstGeom>
+          <a:noFill/>
+        </p:spPr>
+        <p:txBody>
+          <a:bodyPr wrap="square" lIns="0" tIns="0" rIns="0" bIns="0" rtlCol="0">
+            <a:noAutofit/>
+          </a:bodyPr>
+          <a:lstStyle/>
+          <a:p>
+            <a:pPr algn="ctr"/>
+            <a:r>
+              <a:rPr lang="en-US" sz="1100" dirty="0">
+                <a:solidFill>
+                  <a:srgbClr val="7030A0"/>
+                </a:solidFill>
+              </a:rPr>
+              <a:t>*</a:t>
+            </a:r>
+            <a:endParaRPr lang="en-SG" sz="1100" dirty="0">
+              <a:solidFill>
+                <a:srgbClr val="7030A0"/>
+              </a:solidFill>
+            </a:endParaRPr>
+          </a:p>
+        </p:txBody>
+      </p:sp>
+      <p:cxnSp>
+        <p:nvCxnSpPr>
+          <p:cNvPr id="127" name="Straight Arrow Connector 126">
+            <a:extLst>
+              <a:ext uri="{FF2B5EF4-FFF2-40B4-BE49-F238E27FC236}">
+                <a16:creationId xmlns:a16="http://schemas.microsoft.com/office/drawing/2014/main" id="{EE173F4F-283C-47BF-BD78-FE2F7EBCA2E7}"/>
+              </a:ext>
+            </a:extLst>
+          </p:cNvPr>
+          <p:cNvCxnSpPr>
+            <a:cxnSpLocks/>
+            <a:stCxn id="117" idx="1"/>
+            <a:endCxn id="116" idx="1"/>
+          </p:cNvCxnSpPr>
+          <p:nvPr/>
+        </p:nvCxnSpPr>
+        <p:spPr>
+          <a:xfrm>
+            <a:off x="4042736" y="3647896"/>
+            <a:ext cx="411722" cy="12320"/>
+          </a:xfrm>
+          <a:prstGeom prst="straightConnector1">
+            <a:avLst/>
+          </a:prstGeom>
+          <a:ln w="19050">
+            <a:solidFill>
+              <a:srgbClr val="7030A0"/>
+            </a:solidFill>
+            <a:headEnd type="none" w="med" len="med"/>
+            <a:tailEnd type="arrow" w="med" len="med"/>
+          </a:ln>
+          <a:effectLst/>
+        </p:spPr>
+        <p:style>
+          <a:lnRef idx="1">
+            <a:schemeClr val="accent2"/>
+          </a:lnRef>
+          <a:fillRef idx="2">
+            <a:schemeClr val="accent2"/>
+          </a:fillRef>
+          <a:effectRef idx="1">
+            <a:schemeClr val="accent2"/>
+          </a:effectRef>
+          <a:fontRef idx="minor">
+            <a:schemeClr val="dk1"/>
+          </a:fontRef>
+        </p:style>
+      </p:cxnSp>
+      <p:cxnSp>
+        <p:nvCxnSpPr>
+          <p:cNvPr id="128" name="Elbow Connector 63">
+            <a:extLst>
+              <a:ext uri="{FF2B5EF4-FFF2-40B4-BE49-F238E27FC236}">
+                <a16:creationId xmlns:a16="http://schemas.microsoft.com/office/drawing/2014/main" id="{0E54CDA3-27A2-4B23-9AC6-B7C3726544B3}"/>
+              </a:ext>
+            </a:extLst>
+          </p:cNvPr>
+          <p:cNvCxnSpPr/>
+          <p:nvPr/>
+        </p:nvCxnSpPr>
+        <p:spPr>
+          <a:xfrm>
+            <a:off x="5859841" y="3674633"/>
+            <a:ext cx="174986" cy="705"/>
+          </a:xfrm>
+          <a:prstGeom prst="bentConnector3">
+            <a:avLst>
+              <a:gd name="adj1" fmla="val 85382"/>
+            </a:avLst>
+          </a:prstGeom>
+          <a:ln w="19050">
+            <a:solidFill>
+              <a:srgbClr val="7030A0"/>
+            </a:solidFill>
+            <a:headEnd type="none" w="med" len="med"/>
+            <a:tailEnd type="arrow" w="med" len="med"/>
+          </a:ln>
+          <a:effectLst/>
+        </p:spPr>
+        <p:style>
+          <a:lnRef idx="1">
+            <a:schemeClr val="accent2"/>
+          </a:lnRef>
+          <a:fillRef idx="2">
+            <a:schemeClr val="accent2"/>
+          </a:fillRef>
+          <a:effectRef idx="1">
+            <a:schemeClr val="accent2"/>
+          </a:effectRef>
+          <a:fontRef idx="minor">
+            <a:schemeClr val="dk1"/>
+          </a:fontRef>
+        </p:style>
+      </p:cxnSp>
+      <p:sp>
+        <p:nvSpPr>
+          <p:cNvPr id="130" name="Flowchart: Decision 96">
+            <a:extLst>
+              <a:ext uri="{FF2B5EF4-FFF2-40B4-BE49-F238E27FC236}">
+                <a16:creationId xmlns:a16="http://schemas.microsoft.com/office/drawing/2014/main" id="{4A49E59E-F833-4CB1-B742-806880840BF9}"/>
+              </a:ext>
+            </a:extLst>
+          </p:cNvPr>
+          <p:cNvSpPr/>
+          <p:nvPr/>
+        </p:nvSpPr>
+        <p:spPr>
+          <a:xfrm>
+            <a:off x="6752078" y="3591837"/>
+            <a:ext cx="236048" cy="173380"/>
+          </a:xfrm>
+          <a:prstGeom prst="flowChartDecision">
+            <a:avLst/>
+          </a:prstGeom>
+          <a:solidFill>
+            <a:srgbClr val="7030A0"/>
+          </a:solidFill>
+          <a:ln w="19050">
+            <a:solidFill>
+              <a:srgbClr val="7030A0"/>
+            </a:solidFill>
+          </a:ln>
+          <a:effectLst/>
+        </p:spPr>
+        <p:style>
+          <a:lnRef idx="1">
+            <a:schemeClr val="accent6"/>
+          </a:lnRef>
+          <a:fillRef idx="2">
+            <a:schemeClr val="accent6"/>
+          </a:fillRef>
+          <a:effectRef idx="1">
+            <a:schemeClr val="accent6"/>
+          </a:effectRef>
+          <a:fontRef idx="minor">
+            <a:schemeClr val="dk1"/>
+          </a:fontRef>
+        </p:style>
+        <p:txBody>
+          <a:bodyPr rtlCol="0" anchor="ctr"/>
+          <a:lstStyle/>
+          <a:p>
+            <a:pPr algn="ctr"/>
+            <a:endParaRPr lang="en-US" sz="1050"/>
+          </a:p>
+        </p:txBody>
+      </p:sp>
+      <p:cxnSp>
+        <p:nvCxnSpPr>
+          <p:cNvPr id="133" name="Elbow Connector 80">
+            <a:extLst>
+              <a:ext uri="{FF2B5EF4-FFF2-40B4-BE49-F238E27FC236}">
+                <a16:creationId xmlns:a16="http://schemas.microsoft.com/office/drawing/2014/main" id="{1D2D4120-FFE6-480E-A12E-86BD6DF85A54}"/>
+              </a:ext>
+            </a:extLst>
+          </p:cNvPr>
+          <p:cNvCxnSpPr>
+            <a:cxnSpLocks/>
+            <a:endCxn id="166" idx="1"/>
+          </p:cNvCxnSpPr>
+          <p:nvPr/>
+        </p:nvCxnSpPr>
+        <p:spPr>
+          <a:xfrm rot="16200000" flipH="1">
+            <a:off x="7108879" y="3825821"/>
+            <a:ext cx="446558" cy="233941"/>
+          </a:xfrm>
+          <a:prstGeom prst="bentConnector2">
+            <a:avLst/>
+          </a:prstGeom>
+          <a:ln w="19050">
+            <a:solidFill>
+              <a:srgbClr val="7030A0"/>
+            </a:solidFill>
+            <a:headEnd type="none" w="med" len="med"/>
+            <a:tailEnd type="arrow" w="med" len="med"/>
+          </a:ln>
+          <a:effectLst/>
+        </p:spPr>
+        <p:style>
+          <a:lnRef idx="1">
+            <a:schemeClr val="accent2"/>
+          </a:lnRef>
+          <a:fillRef idx="2">
+            <a:schemeClr val="accent2"/>
+          </a:fillRef>
+          <a:effectRef idx="1">
+            <a:schemeClr val="accent2"/>
+          </a:effectRef>
+          <a:fontRef idx="minor">
+            <a:schemeClr val="dk1"/>
+          </a:fontRef>
+        </p:style>
+      </p:cxnSp>
+      <p:cxnSp>
+        <p:nvCxnSpPr>
+          <p:cNvPr id="136" name="Elbow Connector 85">
+            <a:extLst>
+              <a:ext uri="{FF2B5EF4-FFF2-40B4-BE49-F238E27FC236}">
+                <a16:creationId xmlns:a16="http://schemas.microsoft.com/office/drawing/2014/main" id="{2670356E-DC10-4969-B63A-045A9E3B6F43}"/>
+              </a:ext>
+            </a:extLst>
+          </p:cNvPr>
+          <p:cNvCxnSpPr>
+            <a:cxnSpLocks/>
+            <a:stCxn id="130" idx="3"/>
+            <a:endCxn id="164" idx="1"/>
+          </p:cNvCxnSpPr>
+          <p:nvPr/>
+        </p:nvCxnSpPr>
+        <p:spPr>
+          <a:xfrm>
+            <a:off x="6988126" y="3678527"/>
+            <a:ext cx="453959" cy="154349"/>
+          </a:xfrm>
+          <a:prstGeom prst="bentConnector3">
+            <a:avLst>
+              <a:gd name="adj1" fmla="val 50000"/>
+            </a:avLst>
+          </a:prstGeom>
+          <a:ln w="19050">
+            <a:solidFill>
+              <a:srgbClr val="7030A0"/>
+            </a:solidFill>
+            <a:headEnd type="none" w="med" len="med"/>
+            <a:tailEnd type="arrow" w="med" len="med"/>
+          </a:ln>
+          <a:effectLst/>
+        </p:spPr>
+        <p:style>
+          <a:lnRef idx="1">
+            <a:schemeClr val="accent2"/>
+          </a:lnRef>
+          <a:fillRef idx="2">
+            <a:schemeClr val="accent2"/>
+          </a:fillRef>
+          <a:effectRef idx="1">
+            <a:schemeClr val="accent2"/>
+          </a:effectRef>
+          <a:fontRef idx="minor">
+            <a:schemeClr val="dk1"/>
+          </a:fontRef>
+        </p:style>
+      </p:cxnSp>
+      <p:cxnSp>
+        <p:nvCxnSpPr>
+          <p:cNvPr id="138" name="Elbow Connector 78">
+            <a:extLst>
+              <a:ext uri="{FF2B5EF4-FFF2-40B4-BE49-F238E27FC236}">
+                <a16:creationId xmlns:a16="http://schemas.microsoft.com/office/drawing/2014/main" id="{A4A9FD9A-FD6A-4B83-9B77-59F31E3B9062}"/>
+              </a:ext>
+            </a:extLst>
+          </p:cNvPr>
+          <p:cNvCxnSpPr>
+            <a:cxnSpLocks/>
+            <a:endCxn id="163" idx="1"/>
+          </p:cNvCxnSpPr>
+          <p:nvPr/>
+        </p:nvCxnSpPr>
+        <p:spPr>
+          <a:xfrm rot="5400000" flipH="1" flipV="1">
+            <a:off x="7188142" y="3531236"/>
+            <a:ext cx="284383" cy="225522"/>
+          </a:xfrm>
+          <a:prstGeom prst="bentConnector2">
+            <a:avLst/>
+          </a:prstGeom>
+          <a:ln w="19050">
+            <a:solidFill>
+              <a:srgbClr val="7030A0"/>
+            </a:solidFill>
+            <a:headEnd type="none" w="med" len="med"/>
+            <a:tailEnd type="arrow" w="med" len="med"/>
+          </a:ln>
+          <a:effectLst/>
+        </p:spPr>
+        <p:style>
+          <a:lnRef idx="1">
+            <a:schemeClr val="accent2"/>
+          </a:lnRef>
+          <a:fillRef idx="2">
+            <a:schemeClr val="accent2"/>
+          </a:fillRef>
+          <a:effectRef idx="1">
+            <a:schemeClr val="accent2"/>
+          </a:effectRef>
+          <a:fontRef idx="minor">
+            <a:schemeClr val="dk1"/>
+          </a:fontRef>
+        </p:style>
+      </p:cxnSp>
+      <p:sp>
+        <p:nvSpPr>
+          <p:cNvPr id="139" name="TextBox 138">
+            <a:extLst>
+              <a:ext uri="{FF2B5EF4-FFF2-40B4-BE49-F238E27FC236}">
+                <a16:creationId xmlns:a16="http://schemas.microsoft.com/office/drawing/2014/main" id="{AEC82A64-CC0B-4D4F-8C57-F78377C92EA9}"/>
+              </a:ext>
+            </a:extLst>
+          </p:cNvPr>
+          <p:cNvSpPr txBox="1"/>
+          <p:nvPr/>
+        </p:nvSpPr>
+        <p:spPr>
+          <a:xfrm>
+            <a:off x="7261994" y="3339658"/>
+            <a:ext cx="189257" cy="178683"/>
+          </a:xfrm>
+          <a:prstGeom prst="rect">
+            <a:avLst/>
+          </a:prstGeom>
+          <a:noFill/>
+        </p:spPr>
+        <p:txBody>
+          <a:bodyPr wrap="square" lIns="0" tIns="0" rIns="0" bIns="0" rtlCol="0">
+            <a:noAutofit/>
+          </a:bodyPr>
+          <a:lstStyle/>
+          <a:p>
+            <a:pPr algn="ctr"/>
+            <a:r>
+              <a:rPr lang="en-US" sz="1100" dirty="0">
+                <a:solidFill>
+                  <a:srgbClr val="7030A0"/>
+                </a:solidFill>
+              </a:rPr>
+              <a:t>*</a:t>
+            </a:r>
+            <a:endParaRPr lang="en-SG" sz="1100" dirty="0">
+              <a:solidFill>
+                <a:srgbClr val="7030A0"/>
+              </a:solidFill>
+            </a:endParaRPr>
+          </a:p>
+        </p:txBody>
+      </p:sp>
+      <p:sp>
+        <p:nvSpPr>
+          <p:cNvPr id="144" name="Rectangle 8">
+            <a:extLst>
+              <a:ext uri="{FF2B5EF4-FFF2-40B4-BE49-F238E27FC236}">
+                <a16:creationId xmlns:a16="http://schemas.microsoft.com/office/drawing/2014/main" id="{DE4A0FFA-5D8A-4A3F-81BB-DBBEB5999A89}"/>
+              </a:ext>
+            </a:extLst>
+          </p:cNvPr>
+          <p:cNvSpPr/>
+          <p:nvPr/>
+        </p:nvSpPr>
+        <p:spPr>
+          <a:xfrm>
+            <a:off x="7431182" y="1765920"/>
+            <a:ext cx="708186" cy="231555"/>
+          </a:xfrm>
+          <a:prstGeom prst="rect">
+            <a:avLst/>
+          </a:prstGeom>
+          <a:ln w="19050">
+            <a:solidFill>
+              <a:srgbClr val="7030A0"/>
+            </a:solidFill>
+          </a:ln>
+          <a:effectLst/>
+        </p:spPr>
+        <p:style>
+          <a:lnRef idx="1">
+            <a:schemeClr val="accent4"/>
+          </a:lnRef>
+          <a:fillRef idx="2">
+            <a:schemeClr val="accent4"/>
+          </a:fillRef>
+          <a:effectRef idx="1">
+            <a:schemeClr val="accent4"/>
+          </a:effectRef>
+          <a:fontRef idx="minor">
+            <a:schemeClr val="dk1"/>
+          </a:fontRef>
+        </p:style>
+        <p:txBody>
+          <a:bodyPr rtlCol="0" anchor="ctr"/>
+          <a:lstStyle/>
+          <a:p>
+            <a:pPr algn="ctr"/>
+            <a:r>
+              <a:rPr lang="en-US" sz="1050" dirty="0" err="1">
+                <a:solidFill>
+                  <a:srgbClr val="7030A0"/>
+                </a:solidFill>
+              </a:rPr>
+              <a:t>PersonID</a:t>
+            </a:r>
+            <a:endParaRPr lang="en-SG" sz="1050" dirty="0">
+              <a:solidFill>
+                <a:srgbClr val="7030A0"/>
+              </a:solidFill>
+            </a:endParaRPr>
+          </a:p>
+        </p:txBody>
+      </p:sp>
+      <p:sp>
+        <p:nvSpPr>
+          <p:cNvPr id="147" name="Rectangle 8">
+            <a:extLst>
+              <a:ext uri="{FF2B5EF4-FFF2-40B4-BE49-F238E27FC236}">
+                <a16:creationId xmlns:a16="http://schemas.microsoft.com/office/drawing/2014/main" id="{176AE061-EE44-499F-AD87-3C336A297C2B}"/>
+              </a:ext>
+            </a:extLst>
+          </p:cNvPr>
+          <p:cNvSpPr/>
+          <p:nvPr/>
+        </p:nvSpPr>
+        <p:spPr>
+          <a:xfrm>
+            <a:off x="7447763" y="2353216"/>
+            <a:ext cx="691605" cy="222366"/>
+          </a:xfrm>
+          <a:prstGeom prst="rect">
+            <a:avLst/>
+          </a:prstGeom>
+          <a:ln w="19050">
+            <a:solidFill>
+              <a:srgbClr val="7030A0"/>
+            </a:solidFill>
+          </a:ln>
+          <a:effectLst/>
+        </p:spPr>
+        <p:style>
+          <a:lnRef idx="1">
+            <a:schemeClr val="accent4"/>
+          </a:lnRef>
+          <a:fillRef idx="2">
+            <a:schemeClr val="accent4"/>
+          </a:fillRef>
+          <a:effectRef idx="1">
+            <a:schemeClr val="accent4"/>
+          </a:effectRef>
+          <a:fontRef idx="minor">
+            <a:schemeClr val="dk1"/>
+          </a:fontRef>
+        </p:style>
+        <p:txBody>
+          <a:bodyPr rtlCol="0" anchor="ctr"/>
+          <a:lstStyle/>
+          <a:p>
+            <a:pPr algn="ctr"/>
+            <a:r>
+              <a:rPr lang="en-US" sz="1050" dirty="0">
+                <a:solidFill>
+                  <a:srgbClr val="7030A0"/>
+                </a:solidFill>
+              </a:rPr>
+              <a:t>Phone</a:t>
+            </a:r>
+            <a:endParaRPr lang="en-SG" sz="1050" dirty="0">
+              <a:solidFill>
+                <a:srgbClr val="7030A0"/>
+              </a:solidFill>
+            </a:endParaRPr>
+          </a:p>
+        </p:txBody>
+      </p:sp>
+      <p:sp>
+        <p:nvSpPr>
+          <p:cNvPr id="148" name="Rectangle 8">
+            <a:extLst>
+              <a:ext uri="{FF2B5EF4-FFF2-40B4-BE49-F238E27FC236}">
+                <a16:creationId xmlns:a16="http://schemas.microsoft.com/office/drawing/2014/main" id="{114E4628-E28A-4BD2-9179-C680D44141BA}"/>
+              </a:ext>
+            </a:extLst>
+          </p:cNvPr>
+          <p:cNvSpPr/>
+          <p:nvPr/>
+        </p:nvSpPr>
+        <p:spPr>
+          <a:xfrm>
+            <a:off x="7445050" y="2644031"/>
+            <a:ext cx="699465" cy="222366"/>
+          </a:xfrm>
+          <a:prstGeom prst="rect">
+            <a:avLst/>
+          </a:prstGeom>
+          <a:ln w="19050">
+            <a:solidFill>
+              <a:srgbClr val="7030A0"/>
+            </a:solidFill>
+          </a:ln>
+          <a:effectLst/>
+        </p:spPr>
+        <p:style>
+          <a:lnRef idx="1">
+            <a:schemeClr val="accent4"/>
+          </a:lnRef>
+          <a:fillRef idx="2">
+            <a:schemeClr val="accent4"/>
+          </a:fillRef>
+          <a:effectRef idx="1">
+            <a:schemeClr val="accent4"/>
+          </a:effectRef>
+          <a:fontRef idx="minor">
+            <a:schemeClr val="dk1"/>
+          </a:fontRef>
+        </p:style>
+        <p:txBody>
+          <a:bodyPr rtlCol="0" anchor="ctr"/>
+          <a:lstStyle/>
+          <a:p>
+            <a:pPr algn="ctr"/>
+            <a:r>
+              <a:rPr lang="en-US" sz="1050" dirty="0">
+                <a:solidFill>
+                  <a:srgbClr val="7030A0"/>
+                </a:solidFill>
+              </a:rPr>
+              <a:t>Email</a:t>
+            </a:r>
+          </a:p>
+        </p:txBody>
+      </p:sp>
+      <p:sp>
+        <p:nvSpPr>
+          <p:cNvPr id="149" name="Rectangle 8">
+            <a:extLst>
+              <a:ext uri="{FF2B5EF4-FFF2-40B4-BE49-F238E27FC236}">
+                <a16:creationId xmlns:a16="http://schemas.microsoft.com/office/drawing/2014/main" id="{724243C7-AEF2-4EFE-A00E-614C8F3D7EA3}"/>
+              </a:ext>
+            </a:extLst>
+          </p:cNvPr>
+          <p:cNvSpPr/>
+          <p:nvPr/>
+        </p:nvSpPr>
+        <p:spPr>
+          <a:xfrm>
+            <a:off x="7442085" y="2927044"/>
+            <a:ext cx="697283" cy="222366"/>
+          </a:xfrm>
+          <a:prstGeom prst="rect">
+            <a:avLst/>
+          </a:prstGeom>
+          <a:ln w="19050">
+            <a:solidFill>
+              <a:srgbClr val="7030A0"/>
+            </a:solidFill>
+          </a:ln>
+          <a:effectLst/>
+        </p:spPr>
+        <p:style>
+          <a:lnRef idx="1">
+            <a:schemeClr val="accent4"/>
+          </a:lnRef>
+          <a:fillRef idx="2">
+            <a:schemeClr val="accent4"/>
+          </a:fillRef>
+          <a:effectRef idx="1">
+            <a:schemeClr val="accent4"/>
+          </a:effectRef>
+          <a:fontRef idx="minor">
+            <a:schemeClr val="dk1"/>
+          </a:fontRef>
+        </p:style>
+        <p:txBody>
+          <a:bodyPr rtlCol="0" anchor="ctr"/>
+          <a:lstStyle/>
+          <a:p>
+            <a:pPr algn="ctr"/>
+            <a:r>
+              <a:rPr lang="en-US" sz="1050" dirty="0">
+                <a:solidFill>
+                  <a:srgbClr val="7030A0"/>
+                </a:solidFill>
+              </a:rPr>
+              <a:t>Address</a:t>
+            </a:r>
+          </a:p>
+        </p:txBody>
+      </p:sp>
+      <p:cxnSp>
+        <p:nvCxnSpPr>
+          <p:cNvPr id="153" name="Elbow Connector 78">
+            <a:extLst>
+              <a:ext uri="{FF2B5EF4-FFF2-40B4-BE49-F238E27FC236}">
+                <a16:creationId xmlns:a16="http://schemas.microsoft.com/office/drawing/2014/main" id="{00148A00-4ED9-4BBD-BDFE-480628DBBBE9}"/>
+              </a:ext>
+            </a:extLst>
+          </p:cNvPr>
+          <p:cNvCxnSpPr>
+            <a:cxnSpLocks/>
+            <a:endCxn id="144" idx="1"/>
+          </p:cNvCxnSpPr>
+          <p:nvPr/>
+        </p:nvCxnSpPr>
+        <p:spPr>
+          <a:xfrm rot="5400000" flipH="1" flipV="1">
+            <a:off x="6944786" y="2143206"/>
+            <a:ext cx="747903" cy="224889"/>
+          </a:xfrm>
+          <a:prstGeom prst="bentConnector2">
+            <a:avLst/>
+          </a:prstGeom>
+          <a:ln w="19050">
+            <a:solidFill>
+              <a:srgbClr val="7030A0"/>
+            </a:solidFill>
+            <a:headEnd type="none" w="med" len="med"/>
+            <a:tailEnd type="arrow" w="med" len="med"/>
+          </a:ln>
+          <a:effectLst/>
+        </p:spPr>
+        <p:style>
+          <a:lnRef idx="1">
+            <a:schemeClr val="accent2"/>
+          </a:lnRef>
+          <a:fillRef idx="2">
+            <a:schemeClr val="accent2"/>
+          </a:fillRef>
+          <a:effectRef idx="1">
+            <a:schemeClr val="accent2"/>
+          </a:effectRef>
+          <a:fontRef idx="minor">
+            <a:schemeClr val="dk1"/>
+          </a:fontRef>
+        </p:style>
+      </p:cxnSp>
+      <p:sp>
+        <p:nvSpPr>
+          <p:cNvPr id="163" name="Rectangle 8">
+            <a:extLst>
+              <a:ext uri="{FF2B5EF4-FFF2-40B4-BE49-F238E27FC236}">
+                <a16:creationId xmlns:a16="http://schemas.microsoft.com/office/drawing/2014/main" id="{BA9AF45A-190F-406E-A66E-E700A649E199}"/>
+              </a:ext>
+            </a:extLst>
+          </p:cNvPr>
+          <p:cNvSpPr/>
+          <p:nvPr/>
+        </p:nvSpPr>
+        <p:spPr>
+          <a:xfrm>
+            <a:off x="7443094" y="3386112"/>
+            <a:ext cx="708186" cy="231385"/>
+          </a:xfrm>
+          <a:prstGeom prst="rect">
+            <a:avLst/>
+          </a:prstGeom>
+          <a:ln w="19050">
+            <a:solidFill>
+              <a:srgbClr val="7030A0"/>
+            </a:solidFill>
+          </a:ln>
+          <a:effectLst/>
+        </p:spPr>
+        <p:style>
+          <a:lnRef idx="1">
+            <a:schemeClr val="accent4"/>
+          </a:lnRef>
+          <a:fillRef idx="2">
+            <a:schemeClr val="accent4"/>
+          </a:fillRef>
+          <a:effectRef idx="1">
+            <a:schemeClr val="accent4"/>
+          </a:effectRef>
+          <a:fontRef idx="minor">
+            <a:schemeClr val="dk1"/>
+          </a:fontRef>
+        </p:style>
+        <p:txBody>
+          <a:bodyPr rtlCol="0" anchor="ctr"/>
+          <a:lstStyle/>
+          <a:p>
+            <a:pPr algn="ctr"/>
+            <a:r>
+              <a:rPr lang="en-US" sz="1050" dirty="0">
+                <a:solidFill>
+                  <a:srgbClr val="7030A0"/>
+                </a:solidFill>
+              </a:rPr>
+              <a:t>Tag</a:t>
+            </a:r>
+          </a:p>
+        </p:txBody>
+      </p:sp>
+      <p:sp>
+        <p:nvSpPr>
+          <p:cNvPr id="164" name="Rectangle 8">
+            <a:extLst>
+              <a:ext uri="{FF2B5EF4-FFF2-40B4-BE49-F238E27FC236}">
+                <a16:creationId xmlns:a16="http://schemas.microsoft.com/office/drawing/2014/main" id="{0D03DB76-251E-4AF7-B3F9-908787B75E07}"/>
+              </a:ext>
+            </a:extLst>
+          </p:cNvPr>
+          <p:cNvSpPr/>
+          <p:nvPr/>
+        </p:nvSpPr>
+        <p:spPr>
+          <a:xfrm>
+            <a:off x="7442085" y="3717183"/>
+            <a:ext cx="708186" cy="231385"/>
+          </a:xfrm>
+          <a:prstGeom prst="rect">
+            <a:avLst/>
+          </a:prstGeom>
+          <a:ln w="19050">
+            <a:solidFill>
+              <a:srgbClr val="7030A0"/>
+            </a:solidFill>
+          </a:ln>
+          <a:effectLst/>
+        </p:spPr>
+        <p:style>
+          <a:lnRef idx="1">
+            <a:schemeClr val="accent4"/>
+          </a:lnRef>
+          <a:fillRef idx="2">
+            <a:schemeClr val="accent4"/>
+          </a:fillRef>
+          <a:effectRef idx="1">
+            <a:schemeClr val="accent4"/>
+          </a:effectRef>
+          <a:fontRef idx="minor">
+            <a:schemeClr val="dk1"/>
+          </a:fontRef>
+        </p:style>
+        <p:txBody>
+          <a:bodyPr rtlCol="0" anchor="ctr"/>
+          <a:lstStyle/>
+          <a:p>
+            <a:pPr algn="ctr"/>
+            <a:r>
+              <a:rPr lang="en-US" sz="1050" dirty="0" err="1">
+                <a:solidFill>
+                  <a:srgbClr val="7030A0"/>
+                </a:solidFill>
+              </a:rPr>
+              <a:t>eventID</a:t>
+            </a:r>
+            <a:endParaRPr lang="en-US" sz="1050" dirty="0">
+              <a:solidFill>
+                <a:srgbClr val="7030A0"/>
+              </a:solidFill>
+            </a:endParaRPr>
+          </a:p>
+        </p:txBody>
+      </p:sp>
+      <p:sp>
+        <p:nvSpPr>
+          <p:cNvPr id="166" name="Rectangle 8">
+            <a:extLst>
+              <a:ext uri="{FF2B5EF4-FFF2-40B4-BE49-F238E27FC236}">
+                <a16:creationId xmlns:a16="http://schemas.microsoft.com/office/drawing/2014/main" id="{BBD877C8-0956-46BF-AF16-33315E885AC5}"/>
+              </a:ext>
+            </a:extLst>
+          </p:cNvPr>
+          <p:cNvSpPr/>
+          <p:nvPr/>
+        </p:nvSpPr>
+        <p:spPr>
+          <a:xfrm>
+            <a:off x="7449129" y="4050378"/>
+            <a:ext cx="708186" cy="231385"/>
+          </a:xfrm>
+          <a:prstGeom prst="rect">
+            <a:avLst/>
+          </a:prstGeom>
+          <a:ln w="19050">
+            <a:solidFill>
+              <a:srgbClr val="7030A0"/>
+            </a:solidFill>
+          </a:ln>
+          <a:effectLst/>
+        </p:spPr>
+        <p:style>
+          <a:lnRef idx="1">
+            <a:schemeClr val="accent4"/>
+          </a:lnRef>
+          <a:fillRef idx="2">
+            <a:schemeClr val="accent4"/>
+          </a:fillRef>
+          <a:effectRef idx="1">
+            <a:schemeClr val="accent4"/>
+          </a:effectRef>
+          <a:fontRef idx="minor">
+            <a:schemeClr val="dk1"/>
+          </a:fontRef>
+        </p:style>
+        <p:txBody>
+          <a:bodyPr rtlCol="0" anchor="ctr"/>
+          <a:lstStyle/>
+          <a:p>
+            <a:pPr algn="ctr"/>
+            <a:r>
+              <a:rPr lang="en-US" sz="1050" dirty="0" err="1">
+                <a:solidFill>
+                  <a:srgbClr val="7030A0"/>
+                </a:solidFill>
+              </a:rPr>
+              <a:t>PersonID</a:t>
+            </a:r>
+            <a:endParaRPr lang="en-US" sz="1050" dirty="0">
+              <a:solidFill>
+                <a:srgbClr val="7030A0"/>
+              </a:solidFill>
+            </a:endParaRPr>
+          </a:p>
+        </p:txBody>
+      </p:sp>
+      <p:cxnSp>
+        <p:nvCxnSpPr>
+          <p:cNvPr id="176" name="Elbow Connector 106">
+            <a:extLst>
+              <a:ext uri="{FF2B5EF4-FFF2-40B4-BE49-F238E27FC236}">
+                <a16:creationId xmlns:a16="http://schemas.microsoft.com/office/drawing/2014/main" id="{DAE61E4E-2731-47D1-B4CA-CF46AF2C2717}"/>
+              </a:ext>
+            </a:extLst>
+          </p:cNvPr>
+          <p:cNvCxnSpPr>
+            <a:cxnSpLocks/>
+            <a:stCxn id="9" idx="1"/>
+            <a:endCxn id="121" idx="2"/>
+          </p:cNvCxnSpPr>
+          <p:nvPr/>
+        </p:nvCxnSpPr>
+        <p:spPr>
+          <a:xfrm rot="16200000" flipH="1">
+            <a:off x="4283174" y="1743140"/>
+            <a:ext cx="27552" cy="4177168"/>
+          </a:xfrm>
+          <a:prstGeom prst="bentConnector3">
+            <a:avLst>
+              <a:gd name="adj1" fmla="val 3343910"/>
+            </a:avLst>
+          </a:prstGeom>
+          <a:ln w="19050">
+            <a:solidFill>
+              <a:srgbClr val="7030A0"/>
+            </a:solidFill>
+            <a:prstDash val="solid"/>
+            <a:headEnd type="none" w="med" len="med"/>
+            <a:tailEnd type="arrow" w="med" len="med"/>
+          </a:ln>
+          <a:effectLst/>
+        </p:spPr>
+        <p:style>
+          <a:lnRef idx="1">
+            <a:schemeClr val="accent2"/>
+          </a:lnRef>
+          <a:fillRef idx="2">
+            <a:schemeClr val="accent2"/>
+          </a:fillRef>
+          <a:effectRef idx="1">
+            <a:schemeClr val="accent2"/>
+          </a:effectRef>
+          <a:fontRef idx="minor">
+            <a:schemeClr val="dk1"/>
+          </a:fontRef>
+        </p:style>
+      </p:cxnSp>
+      <p:sp>
+        <p:nvSpPr>
+          <p:cNvPr id="180" name="TextBox 179">
+            <a:extLst>
+              <a:ext uri="{FF2B5EF4-FFF2-40B4-BE49-F238E27FC236}">
+                <a16:creationId xmlns:a16="http://schemas.microsoft.com/office/drawing/2014/main" id="{B4C32AA7-B15F-4399-97BE-9E0D6896E75E}"/>
+              </a:ext>
+            </a:extLst>
+          </p:cNvPr>
+          <p:cNvSpPr txBox="1"/>
+          <p:nvPr/>
+        </p:nvSpPr>
+        <p:spPr>
+          <a:xfrm>
+            <a:off x="5545611" y="1726677"/>
+            <a:ext cx="881018" cy="261610"/>
+          </a:xfrm>
+          <a:prstGeom prst="rect">
+            <a:avLst/>
+          </a:prstGeom>
+          <a:noFill/>
+        </p:spPr>
+        <p:txBody>
+          <a:bodyPr wrap="square" rtlCol="0">
+            <a:spAutoFit/>
+          </a:bodyPr>
+          <a:lstStyle/>
+          <a:p>
+            <a:pPr algn="r"/>
+            <a:r>
+              <a:rPr lang="en-US" sz="1100" dirty="0">
+                <a:solidFill>
+                  <a:srgbClr val="7030A0"/>
+                </a:solidFill>
+              </a:rPr>
+              <a:t>filtered list</a:t>
+            </a:r>
+            <a:endParaRPr lang="en-SG" sz="1100" dirty="0">
+              <a:solidFill>
+                <a:srgbClr val="7030A0"/>
+              </a:solidFill>
+            </a:endParaRPr>
+          </a:p>
+        </p:txBody>
+      </p:sp>
+      <p:sp>
+        <p:nvSpPr>
+          <p:cNvPr id="199" name="Isosceles Triangle 102">
+            <a:extLst>
+              <a:ext uri="{FF2B5EF4-FFF2-40B4-BE49-F238E27FC236}">
+                <a16:creationId xmlns:a16="http://schemas.microsoft.com/office/drawing/2014/main" id="{B09543DF-01D2-4926-80DE-D6E331BC2108}"/>
+              </a:ext>
+            </a:extLst>
+          </p:cNvPr>
+          <p:cNvSpPr/>
+          <p:nvPr/>
+        </p:nvSpPr>
+        <p:spPr>
+          <a:xfrm rot="10800000">
+            <a:off x="3381311" y="4039838"/>
+            <a:ext cx="271014" cy="187417"/>
+          </a:xfrm>
+          <a:prstGeom prst="triangle">
+            <a:avLst>
+              <a:gd name="adj" fmla="val 44517"/>
+            </a:avLst>
+          </a:prstGeom>
+          <a:solidFill>
+            <a:schemeClr val="accent4">
+              <a:lumMod val="20000"/>
+              <a:lumOff val="80000"/>
+            </a:schemeClr>
+          </a:solidFill>
+          <a:ln w="19050">
+            <a:solidFill>
+              <a:srgbClr val="7030A0"/>
+            </a:solidFill>
+          </a:ln>
+          <a:effectLst/>
+        </p:spPr>
+        <p:style>
+          <a:lnRef idx="1">
+            <a:schemeClr val="accent6"/>
+          </a:lnRef>
+          <a:fillRef idx="2">
+            <a:schemeClr val="accent6"/>
+          </a:fillRef>
+          <a:effectRef idx="1">
+            <a:schemeClr val="accent6"/>
+          </a:effectRef>
+          <a:fontRef idx="minor">
+            <a:schemeClr val="dk1"/>
+          </a:fontRef>
+        </p:style>
+        <p:txBody>
+          <a:bodyPr rtlCol="0" anchor="ctr"/>
+          <a:lstStyle/>
+          <a:p>
+            <a:pPr algn="ctr"/>
+            <a:endParaRPr lang="en-SG" sz="1050"/>
+          </a:p>
+        </p:txBody>
+      </p:sp>
+      <p:cxnSp>
+        <p:nvCxnSpPr>
+          <p:cNvPr id="200" name="Elbow Connector 63">
+            <a:extLst>
+              <a:ext uri="{FF2B5EF4-FFF2-40B4-BE49-F238E27FC236}">
+                <a16:creationId xmlns:a16="http://schemas.microsoft.com/office/drawing/2014/main" id="{E1FD3BB7-FB03-4A59-B901-91810DB5BA55}"/>
+              </a:ext>
+            </a:extLst>
+          </p:cNvPr>
+          <p:cNvCxnSpPr>
+            <a:cxnSpLocks/>
+          </p:cNvCxnSpPr>
+          <p:nvPr/>
+        </p:nvCxnSpPr>
+        <p:spPr>
+          <a:xfrm rot="16200000" flipH="1">
+            <a:off x="3421783" y="3943162"/>
+            <a:ext cx="196454" cy="1944"/>
+          </a:xfrm>
+          <a:prstGeom prst="bentConnector3">
+            <a:avLst>
+              <a:gd name="adj1" fmla="val 50000"/>
+            </a:avLst>
+          </a:prstGeom>
+          <a:ln w="19050">
+            <a:solidFill>
+              <a:srgbClr val="7030A0"/>
+            </a:solidFill>
+            <a:prstDash val="sysDot"/>
+            <a:headEnd type="none" w="med" len="med"/>
+            <a:tailEnd type="none" w="med" len="med"/>
+          </a:ln>
+          <a:effectLst/>
+        </p:spPr>
+        <p:style>
+          <a:lnRef idx="1">
+            <a:schemeClr val="accent2"/>
+          </a:lnRef>
+          <a:fillRef idx="2">
+            <a:schemeClr val="accent2"/>
+          </a:fillRef>
+          <a:effectRef idx="1">
+            <a:schemeClr val="accent2"/>
+          </a:effectRef>
+          <a:fontRef idx="minor">
+            <a:schemeClr val="dk1"/>
+          </a:fontRef>
+        </p:style>
+      </p:cxnSp>
+      <p:sp>
+        <p:nvSpPr>
+          <p:cNvPr id="201" name="Rectangle 8">
+            <a:extLst>
+              <a:ext uri="{FF2B5EF4-FFF2-40B4-BE49-F238E27FC236}">
+                <a16:creationId xmlns:a16="http://schemas.microsoft.com/office/drawing/2014/main" id="{E4ABED1B-8184-4218-B8A7-F8FA20291052}"/>
+              </a:ext>
+            </a:extLst>
+          </p:cNvPr>
+          <p:cNvSpPr/>
+          <p:nvPr/>
+        </p:nvSpPr>
+        <p:spPr>
+          <a:xfrm>
+            <a:off x="2780127" y="4234340"/>
+            <a:ext cx="1443661" cy="364396"/>
+          </a:xfrm>
+          <a:prstGeom prst="rect">
+            <a:avLst/>
+          </a:prstGeom>
+          <a:ln w="19050">
+            <a:solidFill>
+              <a:srgbClr val="7030A0"/>
+            </a:solidFill>
+          </a:ln>
+          <a:effectLst/>
+        </p:spPr>
+        <p:style>
+          <a:lnRef idx="1">
+            <a:schemeClr val="accent4"/>
+          </a:lnRef>
+          <a:fillRef idx="2">
+            <a:schemeClr val="accent4"/>
+          </a:fillRef>
+          <a:effectRef idx="1">
+            <a:schemeClr val="accent4"/>
+          </a:effectRef>
+          <a:fontRef idx="minor">
+            <a:schemeClr val="dk1"/>
+          </a:fontRef>
+        </p:style>
+        <p:txBody>
+          <a:bodyPr rtlCol="0" anchor="ctr"/>
+          <a:lstStyle/>
+          <a:p>
+            <a:pPr algn="ctr"/>
+            <a:r>
+              <a:rPr lang="en-US" sz="1050" dirty="0">
+                <a:solidFill>
+                  <a:srgbClr val="7030A0"/>
+                </a:solidFill>
+              </a:rPr>
+              <a:t>&lt;&lt;interface&gt;&gt;</a:t>
+            </a:r>
+            <a:br>
+              <a:rPr lang="en-US" sz="1050" dirty="0">
+                <a:solidFill>
+                  <a:srgbClr val="7030A0"/>
+                </a:solidFill>
+              </a:rPr>
+            </a:br>
+            <a:r>
+              <a:rPr lang="en-US" sz="1050" dirty="0" err="1">
+                <a:solidFill>
+                  <a:srgbClr val="7030A0"/>
+                </a:solidFill>
+              </a:rPr>
+              <a:t>ReadOnlySchedule</a:t>
+            </a:r>
+            <a:endParaRPr lang="en-SG" sz="1050" dirty="0">
+              <a:solidFill>
+                <a:srgbClr val="7030A0"/>
+              </a:solidFill>
+            </a:endParaRPr>
+          </a:p>
+        </p:txBody>
+      </p:sp>
     </p:spTree>
     <p:extLst>
       <p:ext uri="{BB962C8B-B14F-4D97-AF65-F5344CB8AC3E}">

</xml_diff>

<commit_message>
update the developer guide and related diagrams
</commit_message>
<xml_diff>
--- a/docs/diagrams/ModelComponentClassDiagram.pptx
+++ b/docs/diagrams/ModelComponentClassDiagram.pptx
@@ -208,7 +208,7 @@
           <a:p>
             <a:fld id="{F5CC4B3F-88C1-4FFA-B1B6-F41C21DC6924}" type="datetimeFigureOut">
               <a:rPr lang="en-US" smtClean="0"/>
-              <a:t>10/15/2018</a:t>
+              <a:t>11/12/18</a:t>
             </a:fld>
             <a:endParaRPr lang="en-US"/>
           </a:p>
@@ -738,7 +738,7 @@
           <a:p>
             <a:fld id="{78C97017-6FC3-485B-9764-EAC9E56C1D49}" type="datetimeFigureOut">
               <a:rPr lang="en-US" smtClean="0"/>
-              <a:t>10/15/2018</a:t>
+              <a:t>11/12/18</a:t>
             </a:fld>
             <a:endParaRPr lang="en-US"/>
           </a:p>
@@ -906,7 +906,7 @@
           <a:p>
             <a:fld id="{78C97017-6FC3-485B-9764-EAC9E56C1D49}" type="datetimeFigureOut">
               <a:rPr lang="en-US" smtClean="0"/>
-              <a:t>10/15/2018</a:t>
+              <a:t>11/12/18</a:t>
             </a:fld>
             <a:endParaRPr lang="en-US"/>
           </a:p>
@@ -1084,7 +1084,7 @@
           <a:p>
             <a:fld id="{78C97017-6FC3-485B-9764-EAC9E56C1D49}" type="datetimeFigureOut">
               <a:rPr lang="en-US" smtClean="0"/>
-              <a:t>10/15/2018</a:t>
+              <a:t>11/12/18</a:t>
             </a:fld>
             <a:endParaRPr lang="en-US"/>
           </a:p>
@@ -1252,7 +1252,7 @@
           <a:p>
             <a:fld id="{78C97017-6FC3-485B-9764-EAC9E56C1D49}" type="datetimeFigureOut">
               <a:rPr lang="en-US" smtClean="0"/>
-              <a:t>10/15/2018</a:t>
+              <a:t>11/12/18</a:t>
             </a:fld>
             <a:endParaRPr lang="en-US"/>
           </a:p>
@@ -1497,7 +1497,7 @@
           <a:p>
             <a:fld id="{78C97017-6FC3-485B-9764-EAC9E56C1D49}" type="datetimeFigureOut">
               <a:rPr lang="en-US" smtClean="0"/>
-              <a:t>10/15/2018</a:t>
+              <a:t>11/12/18</a:t>
             </a:fld>
             <a:endParaRPr lang="en-US"/>
           </a:p>
@@ -1782,7 +1782,7 @@
           <a:p>
             <a:fld id="{78C97017-6FC3-485B-9764-EAC9E56C1D49}" type="datetimeFigureOut">
               <a:rPr lang="en-US" smtClean="0"/>
-              <a:t>10/15/2018</a:t>
+              <a:t>11/12/18</a:t>
             </a:fld>
             <a:endParaRPr lang="en-US"/>
           </a:p>
@@ -2201,7 +2201,7 @@
           <a:p>
             <a:fld id="{78C97017-6FC3-485B-9764-EAC9E56C1D49}" type="datetimeFigureOut">
               <a:rPr lang="en-US" smtClean="0"/>
-              <a:t>10/15/2018</a:t>
+              <a:t>11/12/18</a:t>
             </a:fld>
             <a:endParaRPr lang="en-US"/>
           </a:p>
@@ -2318,7 +2318,7 @@
           <a:p>
             <a:fld id="{78C97017-6FC3-485B-9764-EAC9E56C1D49}" type="datetimeFigureOut">
               <a:rPr lang="en-US" smtClean="0"/>
-              <a:t>10/15/2018</a:t>
+              <a:t>11/12/18</a:t>
             </a:fld>
             <a:endParaRPr lang="en-US"/>
           </a:p>
@@ -2413,7 +2413,7 @@
           <a:p>
             <a:fld id="{78C97017-6FC3-485B-9764-EAC9E56C1D49}" type="datetimeFigureOut">
               <a:rPr lang="en-US" smtClean="0"/>
-              <a:t>10/15/2018</a:t>
+              <a:t>11/12/18</a:t>
             </a:fld>
             <a:endParaRPr lang="en-US"/>
           </a:p>
@@ -2688,7 +2688,7 @@
           <a:p>
             <a:fld id="{78C97017-6FC3-485B-9764-EAC9E56C1D49}" type="datetimeFigureOut">
               <a:rPr lang="en-US" smtClean="0"/>
-              <a:t>10/15/2018</a:t>
+              <a:t>11/12/18</a:t>
             </a:fld>
             <a:endParaRPr lang="en-US"/>
           </a:p>
@@ -2940,7 +2940,7 @@
           <a:p>
             <a:fld id="{78C97017-6FC3-485B-9764-EAC9E56C1D49}" type="datetimeFigureOut">
               <a:rPr lang="en-US" smtClean="0"/>
-              <a:t>10/15/2018</a:t>
+              <a:t>11/12/18</a:t>
             </a:fld>
             <a:endParaRPr lang="en-US"/>
           </a:p>
@@ -3151,7 +3151,7 @@
           <a:p>
             <a:fld id="{78C97017-6FC3-485B-9764-EAC9E56C1D49}" type="datetimeFigureOut">
               <a:rPr lang="en-US" smtClean="0"/>
-              <a:t>10/15/2018</a:t>
+              <a:t>11/12/18</a:t>
             </a:fld>
             <a:endParaRPr lang="en-US"/>
           </a:p>
@@ -3534,8 +3534,8 @@
         </p:nvSpPr>
         <p:spPr>
           <a:xfrm>
-            <a:off x="977321" y="1381021"/>
-            <a:ext cx="7590319" cy="3720776"/>
+            <a:off x="762001" y="1381020"/>
+            <a:ext cx="7805640" cy="3895017"/>
           </a:xfrm>
           <a:prstGeom prst="roundRect">
             <a:avLst>
@@ -3595,7 +3595,7 @@
         </p:nvSpPr>
         <p:spPr>
           <a:xfrm>
-            <a:off x="2973982" y="3075216"/>
+            <a:off x="2973982" y="3082240"/>
             <a:ext cx="1058332" cy="346760"/>
           </a:xfrm>
           <a:prstGeom prst="rect">
@@ -3654,8 +3654,8 @@
         </p:nvSpPr>
         <p:spPr>
           <a:xfrm rot="16200000">
-            <a:off x="1661548" y="3097750"/>
-            <a:ext cx="1093635" cy="346760"/>
+            <a:off x="1410885" y="3348413"/>
+            <a:ext cx="1594961" cy="346760"/>
           </a:xfrm>
           <a:prstGeom prst="rect">
             <a:avLst/>
@@ -3722,7 +3722,7 @@
           </a:xfrm>
           <a:prstGeom prst="bentConnector3">
             <a:avLst>
-              <a:gd name="adj1" fmla="val 2066452"/>
+              <a:gd name="adj1" fmla="val 591613"/>
             </a:avLst>
           </a:prstGeom>
           <a:ln w="19050">
@@ -3880,7 +3880,7 @@
         <p:spPr>
           <a:xfrm>
             <a:off x="2607934" y="3248427"/>
-            <a:ext cx="366048" cy="169"/>
+            <a:ext cx="366048" cy="7193"/>
           </a:xfrm>
           <a:prstGeom prst="straightConnector1">
             <a:avLst/>
@@ -4730,7 +4730,7 @@
         </p:nvSpPr>
         <p:spPr>
           <a:xfrm>
-            <a:off x="5536176" y="4505340"/>
+            <a:off x="6281782" y="4843790"/>
             <a:ext cx="881018" cy="261610"/>
           </a:xfrm>
           <a:prstGeom prst="rect">
@@ -5443,7 +5443,7 @@
         </p:nvCxnSpPr>
         <p:spPr>
           <a:xfrm flipV="1">
-            <a:off x="2625603" y="3656750"/>
+            <a:off x="2625603" y="4156838"/>
             <a:ext cx="347957" cy="3466"/>
           </a:xfrm>
           <a:prstGeom prst="straightConnector1">
@@ -5487,7 +5487,7 @@
         </p:nvSpPr>
         <p:spPr>
           <a:xfrm>
-            <a:off x="2389555" y="3573526"/>
+            <a:off x="2389555" y="4073614"/>
             <a:ext cx="236048" cy="173380"/>
           </a:xfrm>
           <a:prstGeom prst="flowChartDecision">
@@ -5538,7 +5538,7 @@
         </p:nvSpPr>
         <p:spPr>
           <a:xfrm>
-            <a:off x="2625603" y="3449236"/>
+            <a:off x="2625603" y="3949324"/>
             <a:ext cx="170110" cy="137542"/>
           </a:xfrm>
           <a:prstGeom prst="rect">
@@ -5583,7 +5583,7 @@
         </p:nvSpPr>
         <p:spPr>
           <a:xfrm>
-            <a:off x="2973560" y="3474552"/>
+            <a:off x="2973560" y="3974640"/>
             <a:ext cx="1060683" cy="364396"/>
           </a:xfrm>
           <a:prstGeom prst="rect">
@@ -5640,7 +5640,7 @@
         </p:nvSpPr>
         <p:spPr>
           <a:xfrm>
-            <a:off x="4454458" y="3486836"/>
+            <a:off x="4454458" y="3986924"/>
             <a:ext cx="1156969" cy="346760"/>
           </a:xfrm>
           <a:prstGeom prst="rect">
@@ -5718,7 +5718,7 @@
         </p:nvSpPr>
         <p:spPr>
           <a:xfrm>
-            <a:off x="4042736" y="3561206"/>
+            <a:off x="4042736" y="4061294"/>
             <a:ext cx="236048" cy="173380"/>
           </a:xfrm>
           <a:prstGeom prst="flowChartDecision">
@@ -5771,7 +5771,7 @@
         </p:nvSpPr>
         <p:spPr>
           <a:xfrm>
-            <a:off x="6031441" y="3498740"/>
+            <a:off x="6031441" y="3998828"/>
             <a:ext cx="708186" cy="346760"/>
           </a:xfrm>
           <a:prstGeom prst="rect">
@@ -5833,7 +5833,7 @@
         </p:nvSpPr>
         <p:spPr>
           <a:xfrm>
-            <a:off x="5620407" y="3584725"/>
+            <a:off x="5620407" y="4084813"/>
             <a:ext cx="236048" cy="173380"/>
           </a:xfrm>
           <a:prstGeom prst="flowChartDecision">
@@ -5884,7 +5884,7 @@
         </p:nvSpPr>
         <p:spPr>
           <a:xfrm>
-            <a:off x="4306727" y="3448965"/>
+            <a:off x="4306727" y="3949053"/>
             <a:ext cx="189257" cy="178683"/>
           </a:xfrm>
           <a:prstGeom prst="rect">
@@ -5929,7 +5929,7 @@
         </p:nvSpPr>
         <p:spPr>
           <a:xfrm>
-            <a:off x="5859354" y="3486836"/>
+            <a:off x="5859354" y="3986924"/>
             <a:ext cx="189257" cy="178683"/>
           </a:xfrm>
           <a:prstGeom prst="rect">
@@ -5978,7 +5978,7 @@
         </p:nvCxnSpPr>
         <p:spPr>
           <a:xfrm>
-            <a:off x="4042736" y="3647896"/>
+            <a:off x="4042736" y="4147984"/>
             <a:ext cx="411722" cy="12320"/>
           </a:xfrm>
           <a:prstGeom prst="straightConnector1">
@@ -6022,7 +6022,7 @@
         </p:nvCxnSpPr>
         <p:spPr>
           <a:xfrm>
-            <a:off x="5859841" y="3674633"/>
+            <a:off x="5859841" y="4174721"/>
             <a:ext cx="174986" cy="705"/>
           </a:xfrm>
           <a:prstGeom prst="bentConnector3">
@@ -6068,7 +6068,7 @@
         </p:nvSpPr>
         <p:spPr>
           <a:xfrm>
-            <a:off x="6752078" y="3591837"/>
+            <a:off x="6752078" y="4091925"/>
             <a:ext cx="236048" cy="173380"/>
           </a:xfrm>
           <a:prstGeom prst="flowChartDecision">
@@ -6124,7 +6124,7 @@
         </p:nvCxnSpPr>
         <p:spPr>
           <a:xfrm rot="16200000" flipH="1">
-            <a:off x="7108879" y="3825821"/>
+            <a:off x="7108879" y="4325909"/>
             <a:ext cx="446558" cy="233941"/>
           </a:xfrm>
           <a:prstGeom prst="bentConnector2">
@@ -6172,7 +6172,7 @@
         </p:nvCxnSpPr>
         <p:spPr>
           <a:xfrm>
-            <a:off x="6988126" y="3678527"/>
+            <a:off x="6988126" y="4178615"/>
             <a:ext cx="453959" cy="154349"/>
           </a:xfrm>
           <a:prstGeom prst="bentConnector3">
@@ -6221,7 +6221,7 @@
         </p:nvCxnSpPr>
         <p:spPr>
           <a:xfrm rot="5400000" flipH="1" flipV="1">
-            <a:off x="7188142" y="3531236"/>
+            <a:off x="7188142" y="4031324"/>
             <a:ext cx="284383" cy="225522"/>
           </a:xfrm>
           <a:prstGeom prst="bentConnector2">
@@ -6595,7 +6595,7 @@
         </p:nvSpPr>
         <p:spPr>
           <a:xfrm>
-            <a:off x="7443094" y="3386112"/>
+            <a:off x="7443094" y="3886200"/>
             <a:ext cx="708186" cy="231385"/>
           </a:xfrm>
           <a:prstGeom prst="rect">
@@ -6652,7 +6652,7 @@
         </p:nvSpPr>
         <p:spPr>
           <a:xfrm>
-            <a:off x="7442085" y="3717183"/>
+            <a:off x="7442085" y="4217271"/>
             <a:ext cx="708186" cy="231385"/>
           </a:xfrm>
           <a:prstGeom prst="rect">
@@ -6714,7 +6714,7 @@
         </p:nvSpPr>
         <p:spPr>
           <a:xfrm>
-            <a:off x="7449129" y="4050378"/>
+            <a:off x="7449129" y="4550466"/>
             <a:ext cx="708186" cy="231385"/>
           </a:xfrm>
           <a:prstGeom prst="rect">
@@ -6780,12 +6780,12 @@
         </p:nvCxnSpPr>
         <p:spPr>
           <a:xfrm rot="16200000" flipH="1">
-            <a:off x="4283174" y="1743140"/>
-            <a:ext cx="27552" cy="4177168"/>
+            <a:off x="4283793" y="2243847"/>
+            <a:ext cx="26314" cy="4177168"/>
           </a:xfrm>
           <a:prstGeom prst="bentConnector3">
             <a:avLst>
-              <a:gd name="adj1" fmla="val 3343910"/>
+              <a:gd name="adj1" fmla="val 3329927"/>
             </a:avLst>
           </a:prstGeom>
           <a:ln w="19050">
@@ -6872,7 +6872,7 @@
         </p:nvSpPr>
         <p:spPr>
           <a:xfrm rot="10800000">
-            <a:off x="3381311" y="4039838"/>
+            <a:off x="3381311" y="4539926"/>
             <a:ext cx="271014" cy="187417"/>
           </a:xfrm>
           <a:prstGeom prst="triangle">
@@ -6932,7 +6932,7 @@
         </p:nvCxnSpPr>
         <p:spPr>
           <a:xfrm rot="16200000" flipH="1">
-            <a:off x="3421783" y="3943162"/>
+            <a:off x="3421783" y="4443250"/>
             <a:ext cx="196454" cy="1944"/>
           </a:xfrm>
           <a:prstGeom prst="bentConnector3">
@@ -6979,7 +6979,7 @@
         </p:nvSpPr>
         <p:spPr>
           <a:xfrm>
-            <a:off x="2780127" y="4234340"/>
+            <a:off x="2774265" y="4705651"/>
             <a:ext cx="1443661" cy="364396"/>
           </a:xfrm>
           <a:prstGeom prst="rect">
@@ -7039,6 +7039,207 @@
                 <a:srgbClr val="7030A0"/>
               </a:solidFill>
             </a:endParaRPr>
+          </a:p>
+        </p:txBody>
+      </p:sp>
+      <p:cxnSp>
+        <p:nvCxnSpPr>
+          <p:cNvPr id="82" name="Straight Arrow Connector 81">
+            <a:extLst>
+              <a:ext uri="{FF2B5EF4-FFF2-40B4-BE49-F238E27FC236}">
+                <a16:creationId xmlns:a16="http://schemas.microsoft.com/office/drawing/2014/main" id="{7FE454E1-14FB-7F48-A79F-E8A5D1264AC2}"/>
+              </a:ext>
+            </a:extLst>
+          </p:cNvPr>
+          <p:cNvCxnSpPr>
+            <a:cxnSpLocks/>
+            <a:stCxn id="83" idx="3"/>
+            <a:endCxn id="87" idx="1"/>
+          </p:cNvCxnSpPr>
+          <p:nvPr/>
+        </p:nvCxnSpPr>
+        <p:spPr>
+          <a:xfrm flipV="1">
+            <a:off x="2598248" y="3712714"/>
+            <a:ext cx="347957" cy="3466"/>
+          </a:xfrm>
+          <a:prstGeom prst="straightConnector1">
+            <a:avLst/>
+          </a:prstGeom>
+          <a:ln w="19050">
+            <a:solidFill>
+              <a:srgbClr val="7030A0"/>
+            </a:solidFill>
+            <a:headEnd type="none" w="med" len="med"/>
+            <a:tailEnd type="arrow" w="med" len="med"/>
+          </a:ln>
+          <a:effectLst/>
+        </p:spPr>
+        <p:style>
+          <a:lnRef idx="1">
+            <a:schemeClr val="accent2"/>
+          </a:lnRef>
+          <a:fillRef idx="2">
+            <a:schemeClr val="accent2"/>
+          </a:fillRef>
+          <a:effectRef idx="1">
+            <a:schemeClr val="accent2"/>
+          </a:effectRef>
+          <a:fontRef idx="minor">
+            <a:schemeClr val="dk1"/>
+          </a:fontRef>
+        </p:style>
+      </p:cxnSp>
+      <p:sp>
+        <p:nvSpPr>
+          <p:cNvPr id="83" name="Flowchart: Decision 96">
+            <a:extLst>
+              <a:ext uri="{FF2B5EF4-FFF2-40B4-BE49-F238E27FC236}">
+                <a16:creationId xmlns:a16="http://schemas.microsoft.com/office/drawing/2014/main" id="{B5632E3A-530F-1943-BD8E-1E13EF5EB4BC}"/>
+              </a:ext>
+            </a:extLst>
+          </p:cNvPr>
+          <p:cNvSpPr/>
+          <p:nvPr/>
+        </p:nvSpPr>
+        <p:spPr>
+          <a:xfrm>
+            <a:off x="2362200" y="3629490"/>
+            <a:ext cx="236048" cy="173380"/>
+          </a:xfrm>
+          <a:prstGeom prst="flowChartDecision">
+            <a:avLst/>
+          </a:prstGeom>
+          <a:noFill/>
+          <a:ln w="19050">
+            <a:solidFill>
+              <a:srgbClr val="7030A0"/>
+            </a:solidFill>
+          </a:ln>
+          <a:effectLst/>
+        </p:spPr>
+        <p:style>
+          <a:lnRef idx="1">
+            <a:schemeClr val="accent6"/>
+          </a:lnRef>
+          <a:fillRef idx="2">
+            <a:schemeClr val="accent6"/>
+          </a:fillRef>
+          <a:effectRef idx="1">
+            <a:schemeClr val="accent6"/>
+          </a:effectRef>
+          <a:fontRef idx="minor">
+            <a:schemeClr val="dk1"/>
+          </a:fontRef>
+        </p:style>
+        <p:txBody>
+          <a:bodyPr rtlCol="0" anchor="ctr"/>
+          <a:lstStyle/>
+          <a:p>
+            <a:pPr algn="ctr"/>
+            <a:endParaRPr lang="en-US" sz="1050"/>
+          </a:p>
+        </p:txBody>
+      </p:sp>
+      <p:sp>
+        <p:nvSpPr>
+          <p:cNvPr id="85" name="TextBox 84">
+            <a:extLst>
+              <a:ext uri="{FF2B5EF4-FFF2-40B4-BE49-F238E27FC236}">
+                <a16:creationId xmlns:a16="http://schemas.microsoft.com/office/drawing/2014/main" id="{B3183B65-A386-7846-B728-5DC5E788561F}"/>
+              </a:ext>
+            </a:extLst>
+          </p:cNvPr>
+          <p:cNvSpPr txBox="1"/>
+          <p:nvPr/>
+        </p:nvSpPr>
+        <p:spPr>
+          <a:xfrm>
+            <a:off x="2598248" y="3505200"/>
+            <a:ext cx="170110" cy="137542"/>
+          </a:xfrm>
+          <a:prstGeom prst="rect">
+            <a:avLst/>
+          </a:prstGeom>
+          <a:noFill/>
+        </p:spPr>
+        <p:txBody>
+          <a:bodyPr wrap="square" lIns="0" tIns="0" rIns="0" bIns="0" rtlCol="0">
+            <a:noAutofit/>
+          </a:bodyPr>
+          <a:lstStyle/>
+          <a:p>
+            <a:pPr algn="ctr"/>
+            <a:r>
+              <a:rPr lang="en-US" sz="1100" dirty="0">
+                <a:solidFill>
+                  <a:srgbClr val="7030A0"/>
+                </a:solidFill>
+              </a:rPr>
+              <a:t>1</a:t>
+            </a:r>
+            <a:endParaRPr lang="en-SG" sz="1100" dirty="0">
+              <a:solidFill>
+                <a:srgbClr val="7030A0"/>
+              </a:solidFill>
+            </a:endParaRPr>
+          </a:p>
+        </p:txBody>
+      </p:sp>
+      <p:sp>
+        <p:nvSpPr>
+          <p:cNvPr id="87" name="Rectangle 8">
+            <a:extLst>
+              <a:ext uri="{FF2B5EF4-FFF2-40B4-BE49-F238E27FC236}">
+                <a16:creationId xmlns:a16="http://schemas.microsoft.com/office/drawing/2014/main" id="{03EAC638-94F0-6A42-B01E-D55ECE767EBE}"/>
+              </a:ext>
+            </a:extLst>
+          </p:cNvPr>
+          <p:cNvSpPr/>
+          <p:nvPr/>
+        </p:nvSpPr>
+        <p:spPr>
+          <a:xfrm>
+            <a:off x="2946205" y="3530516"/>
+            <a:ext cx="1060683" cy="364396"/>
+          </a:xfrm>
+          <a:prstGeom prst="rect">
+            <a:avLst/>
+          </a:prstGeom>
+          <a:ln w="19050">
+            <a:solidFill>
+              <a:srgbClr val="7030A0"/>
+            </a:solidFill>
+          </a:ln>
+          <a:effectLst/>
+        </p:spPr>
+        <p:style>
+          <a:lnRef idx="1">
+            <a:schemeClr val="accent4"/>
+          </a:lnRef>
+          <a:fillRef idx="2">
+            <a:schemeClr val="accent4"/>
+          </a:fillRef>
+          <a:effectRef idx="1">
+            <a:schemeClr val="accent4"/>
+          </a:effectRef>
+          <a:fontRef idx="minor">
+            <a:schemeClr val="dk1"/>
+          </a:fontRef>
+        </p:style>
+        <p:txBody>
+          <a:bodyPr rtlCol="0" anchor="ctr"/>
+          <a:lstStyle/>
+          <a:p>
+            <a:pPr algn="ctr"/>
+            <a:r>
+              <a:rPr lang="en-US" sz="1050" dirty="0">
+                <a:solidFill>
+                  <a:srgbClr val="7030A0"/>
+                </a:solidFill>
+              </a:rPr>
+              <a:t>Diagnosis</a:t>
+            </a:r>
           </a:p>
         </p:txBody>
       </p:sp>

</xml_diff>